<commit_message>
updated rapport and finished PowerPoint
</commit_message>
<xml_diff>
--- a/rapport/VLSI-project-pres.pptx
+++ b/rapport/VLSI-project-pres.pptx
@@ -178,7 +178,7 @@
           <a:noFill/>
           <a:extLst>
             <a:ext uri="{909E8E84-426E-40dd-AFC4-6F175D3DCCD1}">
-              <a14:hiddenFill xmlns="" xmlns:a14="http://schemas.microsoft.com/office/drawing/2010/main">
+              <a14:hiddenFill xmlns:a14="http://schemas.microsoft.com/office/drawing/2010/main" xmlns="">
                 <a:solidFill>
                   <a:srgbClr val="FFFFFF"/>
                 </a:solidFill>
@@ -238,7 +238,7 @@
             </a:ln>
             <a:extLst>
               <a:ext uri="{91240B29-F687-4f45-9708-019B960494DF}">
-                <a14:hiddenLine xmlns="" xmlns:a14="http://schemas.microsoft.com/office/drawing/2010/main" w="9525">
+                <a14:hiddenLine xmlns:a14="http://schemas.microsoft.com/office/drawing/2010/main" xmlns="" w="9525">
                   <a:solidFill>
                     <a:srgbClr val="000000"/>
                   </a:solidFill>
@@ -328,7 +328,7 @@
             </a:ln>
             <a:extLst>
               <a:ext uri="{91240B29-F687-4f45-9708-019B960494DF}">
-                <a14:hiddenLine xmlns="" xmlns:a14="http://schemas.microsoft.com/office/drawing/2010/main" w="9525">
+                <a14:hiddenLine xmlns:a14="http://schemas.microsoft.com/office/drawing/2010/main" xmlns="" w="9525">
                   <a:solidFill>
                     <a:srgbClr val="000000"/>
                   </a:solidFill>
@@ -418,7 +418,7 @@
             </a:ln>
             <a:extLst>
               <a:ext uri="{91240B29-F687-4f45-9708-019B960494DF}">
-                <a14:hiddenLine xmlns="" xmlns:a14="http://schemas.microsoft.com/office/drawing/2010/main" w="9525">
+                <a14:hiddenLine xmlns:a14="http://schemas.microsoft.com/office/drawing/2010/main" xmlns="" w="9525">
                   <a:solidFill>
                     <a:srgbClr val="000000"/>
                   </a:solidFill>
@@ -452,7 +452,7 @@
             </a:ln>
             <a:extLst>
               <a:ext uri="{91240B29-F687-4f45-9708-019B960494DF}">
-                <a14:hiddenLine xmlns="" xmlns:a14="http://schemas.microsoft.com/office/drawing/2010/main" w="9525">
+                <a14:hiddenLine xmlns:a14="http://schemas.microsoft.com/office/drawing/2010/main" xmlns="" w="9525">
                   <a:solidFill>
                     <a:srgbClr val="000000"/>
                   </a:solidFill>
@@ -542,7 +542,7 @@
             </a:ln>
             <a:extLst>
               <a:ext uri="{91240B29-F687-4f45-9708-019B960494DF}">
-                <a14:hiddenLine xmlns="" xmlns:a14="http://schemas.microsoft.com/office/drawing/2010/main" w="9525">
+                <a14:hiddenLine xmlns:a14="http://schemas.microsoft.com/office/drawing/2010/main" xmlns="" w="9525">
                   <a:solidFill>
                     <a:srgbClr val="000000"/>
                   </a:solidFill>
@@ -604,7 +604,7 @@
             </a:ln>
             <a:extLst>
               <a:ext uri="{91240B29-F687-4f45-9708-019B960494DF}">
-                <a14:hiddenLine xmlns="" xmlns:a14="http://schemas.microsoft.com/office/drawing/2010/main" w="9525">
+                <a14:hiddenLine xmlns:a14="http://schemas.microsoft.com/office/drawing/2010/main" xmlns="" w="9525">
                   <a:solidFill>
                     <a:srgbClr val="000000"/>
                   </a:solidFill>
@@ -666,7 +666,7 @@
             </a:ln>
             <a:extLst>
               <a:ext uri="{91240B29-F687-4f45-9708-019B960494DF}">
-                <a14:hiddenLine xmlns="" xmlns:a14="http://schemas.microsoft.com/office/drawing/2010/main" w="9525">
+                <a14:hiddenLine xmlns:a14="http://schemas.microsoft.com/office/drawing/2010/main" xmlns="" w="9525">
                   <a:solidFill>
                     <a:srgbClr val="000000"/>
                   </a:solidFill>
@@ -756,7 +756,7 @@
             </a:ln>
             <a:extLst>
               <a:ext uri="{91240B29-F687-4f45-9708-019B960494DF}">
-                <a14:hiddenLine xmlns="" xmlns:a14="http://schemas.microsoft.com/office/drawing/2010/main" w="9525">
+                <a14:hiddenLine xmlns:a14="http://schemas.microsoft.com/office/drawing/2010/main" xmlns="" w="9525">
                   <a:solidFill>
                     <a:srgbClr val="000000"/>
                   </a:solidFill>
@@ -818,7 +818,7 @@
             </a:ln>
             <a:extLst>
               <a:ext uri="{91240B29-F687-4f45-9708-019B960494DF}">
-                <a14:hiddenLine xmlns="" xmlns:a14="http://schemas.microsoft.com/office/drawing/2010/main" w="9525">
+                <a14:hiddenLine xmlns:a14="http://schemas.microsoft.com/office/drawing/2010/main" xmlns="" w="9525">
                   <a:solidFill>
                     <a:srgbClr val="000000"/>
                   </a:solidFill>
@@ -880,7 +880,7 @@
             </a:ln>
             <a:extLst>
               <a:ext uri="{91240B29-F687-4f45-9708-019B960494DF}">
-                <a14:hiddenLine xmlns="" xmlns:a14="http://schemas.microsoft.com/office/drawing/2010/main" w="9525">
+                <a14:hiddenLine xmlns:a14="http://schemas.microsoft.com/office/drawing/2010/main" xmlns="" w="9525">
                   <a:solidFill>
                     <a:srgbClr val="000000"/>
                   </a:solidFill>
@@ -970,7 +970,7 @@
             </a:ln>
             <a:extLst>
               <a:ext uri="{91240B29-F687-4f45-9708-019B960494DF}">
-                <a14:hiddenLine xmlns="" xmlns:a14="http://schemas.microsoft.com/office/drawing/2010/main" w="9525">
+                <a14:hiddenLine xmlns:a14="http://schemas.microsoft.com/office/drawing/2010/main" xmlns="" w="9525">
                   <a:solidFill>
                     <a:srgbClr val="000000"/>
                   </a:solidFill>
@@ -1060,7 +1060,7 @@
             </a:ln>
             <a:extLst>
               <a:ext uri="{91240B29-F687-4f45-9708-019B960494DF}">
-                <a14:hiddenLine xmlns="" xmlns:a14="http://schemas.microsoft.com/office/drawing/2010/main" w="9525">
+                <a14:hiddenLine xmlns:a14="http://schemas.microsoft.com/office/drawing/2010/main" xmlns="" w="9525">
                   <a:solidFill>
                     <a:srgbClr val="000000"/>
                   </a:solidFill>
@@ -1122,7 +1122,7 @@
             </a:ln>
             <a:extLst>
               <a:ext uri="{91240B29-F687-4f45-9708-019B960494DF}">
-                <a14:hiddenLine xmlns="" xmlns:a14="http://schemas.microsoft.com/office/drawing/2010/main" w="9525">
+                <a14:hiddenLine xmlns:a14="http://schemas.microsoft.com/office/drawing/2010/main" xmlns="" w="9525">
                   <a:solidFill>
                     <a:srgbClr val="000000"/>
                   </a:solidFill>
@@ -1232,7 +1232,7 @@
             </a:ln>
             <a:extLst>
               <a:ext uri="{91240B29-F687-4f45-9708-019B960494DF}">
-                <a14:hiddenLine xmlns="" xmlns:a14="http://schemas.microsoft.com/office/drawing/2010/main" w="9525">
+                <a14:hiddenLine xmlns:a14="http://schemas.microsoft.com/office/drawing/2010/main" xmlns="" w="9525">
                   <a:solidFill>
                     <a:srgbClr val="000000"/>
                   </a:solidFill>
@@ -1294,7 +1294,7 @@
             </a:ln>
             <a:extLst>
               <a:ext uri="{91240B29-F687-4f45-9708-019B960494DF}">
-                <a14:hiddenLine xmlns="" xmlns:a14="http://schemas.microsoft.com/office/drawing/2010/main" w="9525">
+                <a14:hiddenLine xmlns:a14="http://schemas.microsoft.com/office/drawing/2010/main" xmlns="" w="9525">
                   <a:solidFill>
                     <a:srgbClr val="000000"/>
                   </a:solidFill>
@@ -1384,7 +1384,7 @@
             </a:ln>
             <a:extLst>
               <a:ext uri="{91240B29-F687-4f45-9708-019B960494DF}">
-                <a14:hiddenLine xmlns="" xmlns:a14="http://schemas.microsoft.com/office/drawing/2010/main" w="9525">
+                <a14:hiddenLine xmlns:a14="http://schemas.microsoft.com/office/drawing/2010/main" xmlns="" w="9525">
                   <a:solidFill>
                     <a:srgbClr val="000000"/>
                   </a:solidFill>
@@ -1474,7 +1474,7 @@
             </a:ln>
             <a:extLst>
               <a:ext uri="{91240B29-F687-4f45-9708-019B960494DF}">
-                <a14:hiddenLine xmlns="" xmlns:a14="http://schemas.microsoft.com/office/drawing/2010/main" w="9525">
+                <a14:hiddenLine xmlns:a14="http://schemas.microsoft.com/office/drawing/2010/main" xmlns="" w="9525">
                   <a:solidFill>
                     <a:srgbClr val="000000"/>
                   </a:solidFill>
@@ -1536,7 +1536,7 @@
             </a:ln>
             <a:extLst>
               <a:ext uri="{91240B29-F687-4f45-9708-019B960494DF}">
-                <a14:hiddenLine xmlns="" xmlns:a14="http://schemas.microsoft.com/office/drawing/2010/main" w="9525">
+                <a14:hiddenLine xmlns:a14="http://schemas.microsoft.com/office/drawing/2010/main" xmlns="" w="9525">
                   <a:solidFill>
                     <a:srgbClr val="000000"/>
                   </a:solidFill>
@@ -1626,7 +1626,7 @@
             </a:ln>
             <a:extLst>
               <a:ext uri="{91240B29-F687-4f45-9708-019B960494DF}">
-                <a14:hiddenLine xmlns="" xmlns:a14="http://schemas.microsoft.com/office/drawing/2010/main" w="9525">
+                <a14:hiddenLine xmlns:a14="http://schemas.microsoft.com/office/drawing/2010/main" xmlns="" w="9525">
                   <a:solidFill>
                     <a:srgbClr val="000000"/>
                   </a:solidFill>
@@ -1716,7 +1716,7 @@
             </a:ln>
             <a:extLst>
               <a:ext uri="{91240B29-F687-4f45-9708-019B960494DF}">
-                <a14:hiddenLine xmlns="" xmlns:a14="http://schemas.microsoft.com/office/drawing/2010/main" w="9525">
+                <a14:hiddenLine xmlns:a14="http://schemas.microsoft.com/office/drawing/2010/main" xmlns="" w="9525">
                   <a:solidFill>
                     <a:srgbClr val="000000"/>
                   </a:solidFill>
@@ -1772,7 +1772,7 @@
             </a:ln>
             <a:extLst>
               <a:ext uri="{91240B29-F687-4f45-9708-019B960494DF}">
-                <a14:hiddenLine xmlns="" xmlns:a14="http://schemas.microsoft.com/office/drawing/2010/main" w="9525">
+                <a14:hiddenLine xmlns:a14="http://schemas.microsoft.com/office/drawing/2010/main" xmlns="" w="9525">
                   <a:solidFill>
                     <a:srgbClr val="000000"/>
                   </a:solidFill>
@@ -1862,7 +1862,7 @@
             </a:ln>
             <a:extLst>
               <a:ext uri="{91240B29-F687-4f45-9708-019B960494DF}">
-                <a14:hiddenLine xmlns="" xmlns:a14="http://schemas.microsoft.com/office/drawing/2010/main" w="9525">
+                <a14:hiddenLine xmlns:a14="http://schemas.microsoft.com/office/drawing/2010/main" xmlns="" w="9525">
                   <a:solidFill>
                     <a:srgbClr val="000000"/>
                   </a:solidFill>
@@ -1918,7 +1918,7 @@
             </a:ln>
             <a:extLst>
               <a:ext uri="{91240B29-F687-4f45-9708-019B960494DF}">
-                <a14:hiddenLine xmlns="" xmlns:a14="http://schemas.microsoft.com/office/drawing/2010/main" w="9525">
+                <a14:hiddenLine xmlns:a14="http://schemas.microsoft.com/office/drawing/2010/main" xmlns="" w="9525">
                   <a:solidFill>
                     <a:srgbClr val="000000"/>
                   </a:solidFill>
@@ -2008,7 +2008,7 @@
             </a:ln>
             <a:extLst>
               <a:ext uri="{91240B29-F687-4f45-9708-019B960494DF}">
-                <a14:hiddenLine xmlns="" xmlns:a14="http://schemas.microsoft.com/office/drawing/2010/main" w="9525">
+                <a14:hiddenLine xmlns:a14="http://schemas.microsoft.com/office/drawing/2010/main" xmlns="" w="9525">
                   <a:solidFill>
                     <a:srgbClr val="000000"/>
                   </a:solidFill>
@@ -2076,7 +2076,7 @@
             </a:ln>
             <a:extLst>
               <a:ext uri="{91240B29-F687-4f45-9708-019B960494DF}">
-                <a14:hiddenLine xmlns="" xmlns:a14="http://schemas.microsoft.com/office/drawing/2010/main" w="9525">
+                <a14:hiddenLine xmlns:a14="http://schemas.microsoft.com/office/drawing/2010/main" xmlns="" w="9525">
                   <a:solidFill>
                     <a:srgbClr val="000000"/>
                   </a:solidFill>
@@ -2166,7 +2166,7 @@
             </a:ln>
             <a:extLst>
               <a:ext uri="{91240B29-F687-4f45-9708-019B960494DF}">
-                <a14:hiddenLine xmlns="" xmlns:a14="http://schemas.microsoft.com/office/drawing/2010/main" w="9525">
+                <a14:hiddenLine xmlns:a14="http://schemas.microsoft.com/office/drawing/2010/main" xmlns="" w="9525">
                   <a:solidFill>
                     <a:srgbClr val="000000"/>
                   </a:solidFill>
@@ -2234,7 +2234,7 @@
             </a:ln>
             <a:extLst>
               <a:ext uri="{91240B29-F687-4f45-9708-019B960494DF}">
-                <a14:hiddenLine xmlns="" xmlns:a14="http://schemas.microsoft.com/office/drawing/2010/main" w="9525">
+                <a14:hiddenLine xmlns:a14="http://schemas.microsoft.com/office/drawing/2010/main" xmlns="" w="9525">
                   <a:solidFill>
                     <a:srgbClr val="000000"/>
                   </a:solidFill>
@@ -2324,7 +2324,7 @@
             </a:ln>
             <a:extLst>
               <a:ext uri="{91240B29-F687-4f45-9708-019B960494DF}">
-                <a14:hiddenLine xmlns="" xmlns:a14="http://schemas.microsoft.com/office/drawing/2010/main" w="9525">
+                <a14:hiddenLine xmlns:a14="http://schemas.microsoft.com/office/drawing/2010/main" xmlns="" w="9525">
                   <a:solidFill>
                     <a:srgbClr val="000000"/>
                   </a:solidFill>
@@ -2358,7 +2358,7 @@
             </a:ln>
             <a:extLst>
               <a:ext uri="{91240B29-F687-4f45-9708-019B960494DF}">
-                <a14:hiddenLine xmlns="" xmlns:a14="http://schemas.microsoft.com/office/drawing/2010/main" w="9525">
+                <a14:hiddenLine xmlns:a14="http://schemas.microsoft.com/office/drawing/2010/main" xmlns="" w="9525">
                   <a:solidFill>
                     <a:srgbClr val="000000"/>
                   </a:solidFill>
@@ -2448,7 +2448,7 @@
             </a:ln>
             <a:extLst>
               <a:ext uri="{91240B29-F687-4f45-9708-019B960494DF}">
-                <a14:hiddenLine xmlns="" xmlns:a14="http://schemas.microsoft.com/office/drawing/2010/main" w="9525">
+                <a14:hiddenLine xmlns:a14="http://schemas.microsoft.com/office/drawing/2010/main" xmlns="" w="9525">
                   <a:solidFill>
                     <a:srgbClr val="000000"/>
                   </a:solidFill>
@@ -2510,7 +2510,7 @@
             </a:ln>
             <a:extLst>
               <a:ext uri="{91240B29-F687-4f45-9708-019B960494DF}">
-                <a14:hiddenLine xmlns="" xmlns:a14="http://schemas.microsoft.com/office/drawing/2010/main" w="9525">
+                <a14:hiddenLine xmlns:a14="http://schemas.microsoft.com/office/drawing/2010/main" xmlns="" w="9525">
                   <a:solidFill>
                     <a:srgbClr val="000000"/>
                   </a:solidFill>
@@ -2572,7 +2572,7 @@
             </a:ln>
             <a:extLst>
               <a:ext uri="{91240B29-F687-4f45-9708-019B960494DF}">
-                <a14:hiddenLine xmlns="" xmlns:a14="http://schemas.microsoft.com/office/drawing/2010/main" w="9525">
+                <a14:hiddenLine xmlns:a14="http://schemas.microsoft.com/office/drawing/2010/main" xmlns="" w="9525">
                   <a:solidFill>
                     <a:srgbClr val="000000"/>
                   </a:solidFill>
@@ -2662,7 +2662,7 @@
             </a:ln>
             <a:extLst>
               <a:ext uri="{91240B29-F687-4f45-9708-019B960494DF}">
-                <a14:hiddenLine xmlns="" xmlns:a14="http://schemas.microsoft.com/office/drawing/2010/main" w="9525">
+                <a14:hiddenLine xmlns:a14="http://schemas.microsoft.com/office/drawing/2010/main" xmlns="" w="9525">
                   <a:solidFill>
                     <a:srgbClr val="000000"/>
                   </a:solidFill>
@@ -2730,7 +2730,7 @@
             </a:ln>
             <a:extLst>
               <a:ext uri="{91240B29-F687-4f45-9708-019B960494DF}">
-                <a14:hiddenLine xmlns="" xmlns:a14="http://schemas.microsoft.com/office/drawing/2010/main" w="9525">
+                <a14:hiddenLine xmlns:a14="http://schemas.microsoft.com/office/drawing/2010/main" xmlns="" w="9525">
                   <a:solidFill>
                     <a:srgbClr val="000000"/>
                   </a:solidFill>
@@ -2792,7 +2792,7 @@
             </a:ln>
             <a:extLst>
               <a:ext uri="{91240B29-F687-4f45-9708-019B960494DF}">
-                <a14:hiddenLine xmlns="" xmlns:a14="http://schemas.microsoft.com/office/drawing/2010/main" w="9525">
+                <a14:hiddenLine xmlns:a14="http://schemas.microsoft.com/office/drawing/2010/main" xmlns="" w="9525">
                   <a:solidFill>
                     <a:srgbClr val="000000"/>
                   </a:solidFill>
@@ -2882,7 +2882,7 @@
             </a:ln>
             <a:extLst>
               <a:ext uri="{91240B29-F687-4f45-9708-019B960494DF}">
-                <a14:hiddenLine xmlns="" xmlns:a14="http://schemas.microsoft.com/office/drawing/2010/main" w="9525">
+                <a14:hiddenLine xmlns:a14="http://schemas.microsoft.com/office/drawing/2010/main" xmlns="" w="9525">
                   <a:solidFill>
                     <a:srgbClr val="000000"/>
                   </a:solidFill>
@@ -2944,7 +2944,7 @@
             </a:ln>
             <a:extLst>
               <a:ext uri="{91240B29-F687-4f45-9708-019B960494DF}">
-                <a14:hiddenLine xmlns="" xmlns:a14="http://schemas.microsoft.com/office/drawing/2010/main" w="9525">
+                <a14:hiddenLine xmlns:a14="http://schemas.microsoft.com/office/drawing/2010/main" xmlns="" w="9525">
                   <a:solidFill>
                     <a:srgbClr val="000000"/>
                   </a:solidFill>
@@ -3034,7 +3034,7 @@
             </a:ln>
             <a:extLst>
               <a:ext uri="{91240B29-F687-4f45-9708-019B960494DF}">
-                <a14:hiddenLine xmlns="" xmlns:a14="http://schemas.microsoft.com/office/drawing/2010/main" w="9525">
+                <a14:hiddenLine xmlns:a14="http://schemas.microsoft.com/office/drawing/2010/main" xmlns="" w="9525">
                   <a:solidFill>
                     <a:srgbClr val="000000"/>
                   </a:solidFill>
@@ -3096,7 +3096,7 @@
             </a:ln>
             <a:extLst>
               <a:ext uri="{91240B29-F687-4f45-9708-019B960494DF}">
-                <a14:hiddenLine xmlns="" xmlns:a14="http://schemas.microsoft.com/office/drawing/2010/main" w="9525">
+                <a14:hiddenLine xmlns:a14="http://schemas.microsoft.com/office/drawing/2010/main" xmlns="" w="9525">
                   <a:solidFill>
                     <a:srgbClr val="000000"/>
                   </a:solidFill>
@@ -3186,7 +3186,7 @@
             </a:ln>
             <a:extLst>
               <a:ext uri="{91240B29-F687-4f45-9708-019B960494DF}">
-                <a14:hiddenLine xmlns="" xmlns:a14="http://schemas.microsoft.com/office/drawing/2010/main" w="9525">
+                <a14:hiddenLine xmlns:a14="http://schemas.microsoft.com/office/drawing/2010/main" xmlns="" w="9525">
                   <a:solidFill>
                     <a:srgbClr val="000000"/>
                   </a:solidFill>
@@ -3220,7 +3220,7 @@
             </a:ln>
             <a:extLst>
               <a:ext uri="{91240B29-F687-4f45-9708-019B960494DF}">
-                <a14:hiddenLine xmlns="" xmlns:a14="http://schemas.microsoft.com/office/drawing/2010/main" w="9525">
+                <a14:hiddenLine xmlns:a14="http://schemas.microsoft.com/office/drawing/2010/main" xmlns="" w="9525">
                   <a:solidFill>
                     <a:srgbClr val="000000"/>
                   </a:solidFill>
@@ -3285,7 +3285,7 @@
             </a:ln>
             <a:extLst>
               <a:ext uri="{91240B29-F687-4f45-9708-019B960494DF}">
-                <a14:hiddenLine xmlns="" xmlns:a14="http://schemas.microsoft.com/office/drawing/2010/main" w="9525">
+                <a14:hiddenLine xmlns:a14="http://schemas.microsoft.com/office/drawing/2010/main" xmlns="" w="9525">
                   <a:solidFill>
                     <a:srgbClr val="000000"/>
                   </a:solidFill>
@@ -3375,7 +3375,7 @@
             </a:ln>
             <a:extLst>
               <a:ext uri="{91240B29-F687-4f45-9708-019B960494DF}">
-                <a14:hiddenLine xmlns="" xmlns:a14="http://schemas.microsoft.com/office/drawing/2010/main" w="9525">
+                <a14:hiddenLine xmlns:a14="http://schemas.microsoft.com/office/drawing/2010/main" xmlns="" w="9525">
                   <a:solidFill>
                     <a:srgbClr val="000000"/>
                   </a:solidFill>
@@ -3437,7 +3437,7 @@
             </a:ln>
             <a:extLst>
               <a:ext uri="{91240B29-F687-4f45-9708-019B960494DF}">
-                <a14:hiddenLine xmlns="" xmlns:a14="http://schemas.microsoft.com/office/drawing/2010/main" w="9525">
+                <a14:hiddenLine xmlns:a14="http://schemas.microsoft.com/office/drawing/2010/main" xmlns="" w="9525">
                   <a:solidFill>
                     <a:srgbClr val="000000"/>
                   </a:solidFill>
@@ -3527,7 +3527,7 @@
             </a:ln>
             <a:extLst>
               <a:ext uri="{91240B29-F687-4f45-9708-019B960494DF}">
-                <a14:hiddenLine xmlns="" xmlns:a14="http://schemas.microsoft.com/office/drawing/2010/main" w="9525">
+                <a14:hiddenLine xmlns:a14="http://schemas.microsoft.com/office/drawing/2010/main" xmlns="" w="9525">
                   <a:solidFill>
                     <a:srgbClr val="000000"/>
                   </a:solidFill>
@@ -3617,7 +3617,7 @@
             </a:ln>
             <a:extLst>
               <a:ext uri="{91240B29-F687-4f45-9708-019B960494DF}">
-                <a14:hiddenLine xmlns="" xmlns:a14="http://schemas.microsoft.com/office/drawing/2010/main" w="9525">
+                <a14:hiddenLine xmlns:a14="http://schemas.microsoft.com/office/drawing/2010/main" xmlns="" w="9525">
                   <a:solidFill>
                     <a:srgbClr val="000000"/>
                   </a:solidFill>
@@ -3682,7 +3682,7 @@
             </a:ln>
             <a:extLst>
               <a:ext uri="{91240B29-F687-4f45-9708-019B960494DF}">
-                <a14:hiddenLine xmlns="" xmlns:a14="http://schemas.microsoft.com/office/drawing/2010/main" w="9525">
+                <a14:hiddenLine xmlns:a14="http://schemas.microsoft.com/office/drawing/2010/main" xmlns="" w="9525">
                   <a:solidFill>
                     <a:srgbClr val="000000"/>
                   </a:solidFill>
@@ -3744,7 +3744,7 @@
             </a:ln>
             <a:extLst>
               <a:ext uri="{91240B29-F687-4f45-9708-019B960494DF}">
-                <a14:hiddenLine xmlns="" xmlns:a14="http://schemas.microsoft.com/office/drawing/2010/main" w="9525">
+                <a14:hiddenLine xmlns:a14="http://schemas.microsoft.com/office/drawing/2010/main" xmlns="" w="9525">
                   <a:solidFill>
                     <a:srgbClr val="000000"/>
                   </a:solidFill>
@@ -3834,7 +3834,7 @@
             </a:ln>
             <a:extLst>
               <a:ext uri="{91240B29-F687-4f45-9708-019B960494DF}">
-                <a14:hiddenLine xmlns="" xmlns:a14="http://schemas.microsoft.com/office/drawing/2010/main" w="9525">
+                <a14:hiddenLine xmlns:a14="http://schemas.microsoft.com/office/drawing/2010/main" xmlns="" w="9525">
                   <a:solidFill>
                     <a:srgbClr val="000000"/>
                   </a:solidFill>
@@ -3924,7 +3924,7 @@
             </a:ln>
             <a:extLst>
               <a:ext uri="{91240B29-F687-4f45-9708-019B960494DF}">
-                <a14:hiddenLine xmlns="" xmlns:a14="http://schemas.microsoft.com/office/drawing/2010/main" w="9525">
+                <a14:hiddenLine xmlns:a14="http://schemas.microsoft.com/office/drawing/2010/main" xmlns="" w="9525">
                   <a:solidFill>
                     <a:srgbClr val="000000"/>
                   </a:solidFill>
@@ -3986,7 +3986,7 @@
             </a:ln>
             <a:extLst>
               <a:ext uri="{91240B29-F687-4f45-9708-019B960494DF}">
-                <a14:hiddenLine xmlns="" xmlns:a14="http://schemas.microsoft.com/office/drawing/2010/main" w="9525">
+                <a14:hiddenLine xmlns:a14="http://schemas.microsoft.com/office/drawing/2010/main" xmlns="" w="9525">
                   <a:solidFill>
                     <a:srgbClr val="000000"/>
                   </a:solidFill>
@@ -4106,7 +4106,7 @@
             </a:ln>
             <a:extLst>
               <a:ext uri="{91240B29-F687-4f45-9708-019B960494DF}">
-                <a14:hiddenLine xmlns="" xmlns:a14="http://schemas.microsoft.com/office/drawing/2010/main" w="9525">
+                <a14:hiddenLine xmlns:a14="http://schemas.microsoft.com/office/drawing/2010/main" xmlns="" w="9525">
                   <a:solidFill>
                     <a:srgbClr val="000000"/>
                   </a:solidFill>
@@ -4174,7 +4174,7 @@
             </a:ln>
             <a:extLst>
               <a:ext uri="{91240B29-F687-4f45-9708-019B960494DF}">
-                <a14:hiddenLine xmlns="" xmlns:a14="http://schemas.microsoft.com/office/drawing/2010/main" w="9525">
+                <a14:hiddenLine xmlns:a14="http://schemas.microsoft.com/office/drawing/2010/main" xmlns="" w="9525">
                   <a:solidFill>
                     <a:srgbClr val="000000"/>
                   </a:solidFill>
@@ -4264,7 +4264,7 @@
             </a:ln>
             <a:extLst>
               <a:ext uri="{91240B29-F687-4f45-9708-019B960494DF}">
-                <a14:hiddenLine xmlns="" xmlns:a14="http://schemas.microsoft.com/office/drawing/2010/main" w="9525">
+                <a14:hiddenLine xmlns:a14="http://schemas.microsoft.com/office/drawing/2010/main" xmlns="" w="9525">
                   <a:solidFill>
                     <a:srgbClr val="000000"/>
                   </a:solidFill>
@@ -9071,7 +9071,7 @@
           <a:noFill/>
           <a:extLst>
             <a:ext uri="{909E8E84-426E-40dd-AFC4-6F175D3DCCD1}">
-              <a14:hiddenFill xmlns="" xmlns:a14="http://schemas.microsoft.com/office/drawing/2010/main">
+              <a14:hiddenFill xmlns:a14="http://schemas.microsoft.com/office/drawing/2010/main" xmlns="">
                 <a:solidFill>
                   <a:srgbClr val="FFFFFF"/>
                 </a:solidFill>
@@ -9145,7 +9145,7 @@
               </a:ln>
               <a:extLst>
                 <a:ext uri="{91240B29-F687-4f45-9708-019B960494DF}">
-                  <a14:hiddenLine xmlns="" xmlns:a14="http://schemas.microsoft.com/office/drawing/2010/main" w="9525">
+                  <a14:hiddenLine xmlns:a14="http://schemas.microsoft.com/office/drawing/2010/main" xmlns="" w="9525">
                     <a:solidFill>
                       <a:srgbClr val="000000"/>
                     </a:solidFill>
@@ -9235,7 +9235,7 @@
               </a:ln>
               <a:extLst>
                 <a:ext uri="{91240B29-F687-4f45-9708-019B960494DF}">
-                  <a14:hiddenLine xmlns="" xmlns:a14="http://schemas.microsoft.com/office/drawing/2010/main" w="9525">
+                  <a14:hiddenLine xmlns:a14="http://schemas.microsoft.com/office/drawing/2010/main" xmlns="" w="9525">
                     <a:solidFill>
                       <a:srgbClr val="000000"/>
                     </a:solidFill>
@@ -9325,7 +9325,7 @@
               </a:ln>
               <a:extLst>
                 <a:ext uri="{91240B29-F687-4f45-9708-019B960494DF}">
-                  <a14:hiddenLine xmlns="" xmlns:a14="http://schemas.microsoft.com/office/drawing/2010/main" w="9525">
+                  <a14:hiddenLine xmlns:a14="http://schemas.microsoft.com/office/drawing/2010/main" xmlns="" w="9525">
                     <a:solidFill>
                       <a:srgbClr val="000000"/>
                     </a:solidFill>
@@ -9387,7 +9387,7 @@
               </a:ln>
               <a:extLst>
                 <a:ext uri="{91240B29-F687-4f45-9708-019B960494DF}">
-                  <a14:hiddenLine xmlns="" xmlns:a14="http://schemas.microsoft.com/office/drawing/2010/main" w="9525">
+                  <a14:hiddenLine xmlns:a14="http://schemas.microsoft.com/office/drawing/2010/main" xmlns="" w="9525">
                     <a:solidFill>
                       <a:srgbClr val="000000"/>
                     </a:solidFill>
@@ -9477,7 +9477,7 @@
               </a:ln>
               <a:extLst>
                 <a:ext uri="{91240B29-F687-4f45-9708-019B960494DF}">
-                  <a14:hiddenLine xmlns="" xmlns:a14="http://schemas.microsoft.com/office/drawing/2010/main" w="9525">
+                  <a14:hiddenLine xmlns:a14="http://schemas.microsoft.com/office/drawing/2010/main" xmlns="" w="9525">
                     <a:solidFill>
                       <a:srgbClr val="000000"/>
                     </a:solidFill>
@@ -9539,7 +9539,7 @@
               </a:ln>
               <a:extLst>
                 <a:ext uri="{91240B29-F687-4f45-9708-019B960494DF}">
-                  <a14:hiddenLine xmlns="" xmlns:a14="http://schemas.microsoft.com/office/drawing/2010/main" w="9525">
+                  <a14:hiddenLine xmlns:a14="http://schemas.microsoft.com/office/drawing/2010/main" xmlns="" w="9525">
                     <a:solidFill>
                       <a:srgbClr val="000000"/>
                     </a:solidFill>
@@ -9601,7 +9601,7 @@
               </a:ln>
               <a:extLst>
                 <a:ext uri="{91240B29-F687-4f45-9708-019B960494DF}">
-                  <a14:hiddenLine xmlns="" xmlns:a14="http://schemas.microsoft.com/office/drawing/2010/main" w="9525">
+                  <a14:hiddenLine xmlns:a14="http://schemas.microsoft.com/office/drawing/2010/main" xmlns="" w="9525">
                     <a:solidFill>
                       <a:srgbClr val="000000"/>
                     </a:solidFill>
@@ -9691,7 +9691,7 @@
               </a:ln>
               <a:extLst>
                 <a:ext uri="{91240B29-F687-4f45-9708-019B960494DF}">
-                  <a14:hiddenLine xmlns="" xmlns:a14="http://schemas.microsoft.com/office/drawing/2010/main" w="9525">
+                  <a14:hiddenLine xmlns:a14="http://schemas.microsoft.com/office/drawing/2010/main" xmlns="" w="9525">
                     <a:solidFill>
                       <a:srgbClr val="000000"/>
                     </a:solidFill>
@@ -9781,7 +9781,7 @@
               </a:ln>
               <a:extLst>
                 <a:ext uri="{91240B29-F687-4f45-9708-019B960494DF}">
-                  <a14:hiddenLine xmlns="" xmlns:a14="http://schemas.microsoft.com/office/drawing/2010/main" w="9525">
+                  <a14:hiddenLine xmlns:a14="http://schemas.microsoft.com/office/drawing/2010/main" xmlns="" w="9525">
                     <a:solidFill>
                       <a:srgbClr val="000000"/>
                     </a:solidFill>
@@ -9843,7 +9843,7 @@
               </a:ln>
               <a:extLst>
                 <a:ext uri="{91240B29-F687-4f45-9708-019B960494DF}">
-                  <a14:hiddenLine xmlns="" xmlns:a14="http://schemas.microsoft.com/office/drawing/2010/main" w="9525">
+                  <a14:hiddenLine xmlns:a14="http://schemas.microsoft.com/office/drawing/2010/main" xmlns="" w="9525">
                     <a:solidFill>
                       <a:srgbClr val="000000"/>
                     </a:solidFill>
@@ -9953,7 +9953,7 @@
               </a:ln>
               <a:extLst>
                 <a:ext uri="{91240B29-F687-4f45-9708-019B960494DF}">
-                  <a14:hiddenLine xmlns="" xmlns:a14="http://schemas.microsoft.com/office/drawing/2010/main" w="9525">
+                  <a14:hiddenLine xmlns:a14="http://schemas.microsoft.com/office/drawing/2010/main" xmlns="" w="9525">
                     <a:solidFill>
                       <a:srgbClr val="000000"/>
                     </a:solidFill>
@@ -10037,7 +10037,7 @@
               </a:ln>
               <a:extLst>
                 <a:ext uri="{91240B29-F687-4f45-9708-019B960494DF}">
-                  <a14:hiddenLine xmlns="" xmlns:a14="http://schemas.microsoft.com/office/drawing/2010/main" w="9525">
+                  <a14:hiddenLine xmlns:a14="http://schemas.microsoft.com/office/drawing/2010/main" xmlns="" w="9525">
                     <a:solidFill>
                       <a:srgbClr val="000000"/>
                     </a:solidFill>
@@ -10099,7 +10099,7 @@
               </a:ln>
               <a:extLst>
                 <a:ext uri="{91240B29-F687-4f45-9708-019B960494DF}">
-                  <a14:hiddenLine xmlns="" xmlns:a14="http://schemas.microsoft.com/office/drawing/2010/main" w="9525">
+                  <a14:hiddenLine xmlns:a14="http://schemas.microsoft.com/office/drawing/2010/main" xmlns="" w="9525">
                     <a:solidFill>
                       <a:srgbClr val="000000"/>
                     </a:solidFill>
@@ -10161,7 +10161,7 @@
               </a:ln>
               <a:extLst>
                 <a:ext uri="{91240B29-F687-4f45-9708-019B960494DF}">
-                  <a14:hiddenLine xmlns="" xmlns:a14="http://schemas.microsoft.com/office/drawing/2010/main" w="9525">
+                  <a14:hiddenLine xmlns:a14="http://schemas.microsoft.com/office/drawing/2010/main" xmlns="" w="9525">
                     <a:solidFill>
                       <a:srgbClr val="000000"/>
                     </a:solidFill>
@@ -10251,7 +10251,7 @@
               </a:ln>
               <a:extLst>
                 <a:ext uri="{91240B29-F687-4f45-9708-019B960494DF}">
-                  <a14:hiddenLine xmlns="" xmlns:a14="http://schemas.microsoft.com/office/drawing/2010/main" w="9525">
+                  <a14:hiddenLine xmlns:a14="http://schemas.microsoft.com/office/drawing/2010/main" xmlns="" w="9525">
                     <a:solidFill>
                       <a:srgbClr val="000000"/>
                     </a:solidFill>
@@ -10285,7 +10285,7 @@
               </a:ln>
               <a:extLst>
                 <a:ext uri="{91240B29-F687-4f45-9708-019B960494DF}">
-                  <a14:hiddenLine xmlns="" xmlns:a14="http://schemas.microsoft.com/office/drawing/2010/main" w="9525">
+                  <a14:hiddenLine xmlns:a14="http://schemas.microsoft.com/office/drawing/2010/main" xmlns="" w="9525">
                     <a:solidFill>
                       <a:srgbClr val="000000"/>
                     </a:solidFill>
@@ -10350,7 +10350,7 @@
               </a:ln>
               <a:extLst>
                 <a:ext uri="{91240B29-F687-4f45-9708-019B960494DF}">
-                  <a14:hiddenLine xmlns="" xmlns:a14="http://schemas.microsoft.com/office/drawing/2010/main" w="9525">
+                  <a14:hiddenLine xmlns:a14="http://schemas.microsoft.com/office/drawing/2010/main" xmlns="" w="9525">
                     <a:solidFill>
                       <a:srgbClr val="000000"/>
                     </a:solidFill>
@@ -10440,7 +10440,7 @@
               </a:ln>
               <a:extLst>
                 <a:ext uri="{91240B29-F687-4f45-9708-019B960494DF}">
-                  <a14:hiddenLine xmlns="" xmlns:a14="http://schemas.microsoft.com/office/drawing/2010/main" w="9525">
+                  <a14:hiddenLine xmlns:a14="http://schemas.microsoft.com/office/drawing/2010/main" xmlns="" w="9525">
                     <a:solidFill>
                       <a:srgbClr val="000000"/>
                     </a:solidFill>
@@ -10502,7 +10502,7 @@
               </a:ln>
               <a:extLst>
                 <a:ext uri="{91240B29-F687-4f45-9708-019B960494DF}">
-                  <a14:hiddenLine xmlns="" xmlns:a14="http://schemas.microsoft.com/office/drawing/2010/main" w="9525">
+                  <a14:hiddenLine xmlns:a14="http://schemas.microsoft.com/office/drawing/2010/main" xmlns="" w="9525">
                     <a:solidFill>
                       <a:srgbClr val="000000"/>
                     </a:solidFill>
@@ -10592,7 +10592,7 @@
               </a:ln>
               <a:extLst>
                 <a:ext uri="{91240B29-F687-4f45-9708-019B960494DF}">
-                  <a14:hiddenLine xmlns="" xmlns:a14="http://schemas.microsoft.com/office/drawing/2010/main" w="9525">
+                  <a14:hiddenLine xmlns:a14="http://schemas.microsoft.com/office/drawing/2010/main" xmlns="" w="9525">
                     <a:solidFill>
                       <a:srgbClr val="000000"/>
                     </a:solidFill>
@@ -10657,7 +10657,7 @@
               </a:ln>
               <a:extLst>
                 <a:ext uri="{91240B29-F687-4f45-9708-019B960494DF}">
-                  <a14:hiddenLine xmlns="" xmlns:a14="http://schemas.microsoft.com/office/drawing/2010/main" w="9525">
+                  <a14:hiddenLine xmlns:a14="http://schemas.microsoft.com/office/drawing/2010/main" xmlns="" w="9525">
                     <a:solidFill>
                       <a:srgbClr val="000000"/>
                     </a:solidFill>
@@ -10719,7 +10719,7 @@
               </a:ln>
               <a:extLst>
                 <a:ext uri="{91240B29-F687-4f45-9708-019B960494DF}">
-                  <a14:hiddenLine xmlns="" xmlns:a14="http://schemas.microsoft.com/office/drawing/2010/main" w="9525">
+                  <a14:hiddenLine xmlns:a14="http://schemas.microsoft.com/office/drawing/2010/main" xmlns="" w="9525">
                     <a:solidFill>
                       <a:srgbClr val="000000"/>
                     </a:solidFill>
@@ -10809,7 +10809,7 @@
               </a:ln>
               <a:extLst>
                 <a:ext uri="{91240B29-F687-4f45-9708-019B960494DF}">
-                  <a14:hiddenLine xmlns="" xmlns:a14="http://schemas.microsoft.com/office/drawing/2010/main" w="9525">
+                  <a14:hiddenLine xmlns:a14="http://schemas.microsoft.com/office/drawing/2010/main" xmlns="" w="9525">
                     <a:solidFill>
                       <a:srgbClr val="000000"/>
                     </a:solidFill>
@@ -10899,7 +10899,7 @@
               </a:ln>
               <a:extLst>
                 <a:ext uri="{91240B29-F687-4f45-9708-019B960494DF}">
-                  <a14:hiddenLine xmlns="" xmlns:a14="http://schemas.microsoft.com/office/drawing/2010/main" w="9525">
+                  <a14:hiddenLine xmlns:a14="http://schemas.microsoft.com/office/drawing/2010/main" xmlns="" w="9525">
                     <a:solidFill>
                       <a:srgbClr val="000000"/>
                     </a:solidFill>
@@ -10964,7 +10964,7 @@
               </a:ln>
               <a:extLst>
                 <a:ext uri="{91240B29-F687-4f45-9708-019B960494DF}">
-                  <a14:hiddenLine xmlns="" xmlns:a14="http://schemas.microsoft.com/office/drawing/2010/main" w="9525">
+                  <a14:hiddenLine xmlns:a14="http://schemas.microsoft.com/office/drawing/2010/main" xmlns="" w="9525">
                     <a:solidFill>
                       <a:srgbClr val="000000"/>
                     </a:solidFill>
@@ -11084,7 +11084,7 @@
               </a:ln>
               <a:extLst>
                 <a:ext uri="{91240B29-F687-4f45-9708-019B960494DF}">
-                  <a14:hiddenLine xmlns="" xmlns:a14="http://schemas.microsoft.com/office/drawing/2010/main" w="9525">
+                  <a14:hiddenLine xmlns:a14="http://schemas.microsoft.com/office/drawing/2010/main" xmlns="" w="9525">
                     <a:solidFill>
                       <a:srgbClr val="000000"/>
                     </a:solidFill>
@@ -11182,7 +11182,7 @@
               </a:ln>
               <a:extLst>
                 <a:ext uri="{91240B29-F687-4f45-9708-019B960494DF}">
-                  <a14:hiddenLine xmlns="" xmlns:a14="http://schemas.microsoft.com/office/drawing/2010/main" w="9525">
+                  <a14:hiddenLine xmlns:a14="http://schemas.microsoft.com/office/drawing/2010/main" xmlns="" w="9525">
                     <a:solidFill>
                       <a:srgbClr val="000000"/>
                     </a:solidFill>
@@ -11297,7 +11297,7 @@
               </a:ln>
               <a:extLst>
                 <a:ext uri="{91240B29-F687-4f45-9708-019B960494DF}">
-                  <a14:hiddenLine xmlns="" xmlns:a14="http://schemas.microsoft.com/office/drawing/2010/main" w="9525">
+                  <a14:hiddenLine xmlns:a14="http://schemas.microsoft.com/office/drawing/2010/main" xmlns="" w="9525">
                     <a:solidFill>
                       <a:srgbClr val="000000"/>
                     </a:solidFill>
@@ -11387,7 +11387,7 @@
               </a:ln>
               <a:extLst>
                 <a:ext uri="{91240B29-F687-4f45-9708-019B960494DF}">
-                  <a14:hiddenLine xmlns="" xmlns:a14="http://schemas.microsoft.com/office/drawing/2010/main" w="9525">
+                  <a14:hiddenLine xmlns:a14="http://schemas.microsoft.com/office/drawing/2010/main" xmlns="" w="9525">
                     <a:solidFill>
                       <a:srgbClr val="000000"/>
                     </a:solidFill>
@@ -11452,7 +11452,7 @@
               </a:ln>
               <a:extLst>
                 <a:ext uri="{91240B29-F687-4f45-9708-019B960494DF}">
-                  <a14:hiddenLine xmlns="" xmlns:a14="http://schemas.microsoft.com/office/drawing/2010/main" w="9525">
+                  <a14:hiddenLine xmlns:a14="http://schemas.microsoft.com/office/drawing/2010/main" xmlns="" w="9525">
                     <a:solidFill>
                       <a:srgbClr val="000000"/>
                     </a:solidFill>
@@ -11542,7 +11542,7 @@
               </a:ln>
               <a:extLst>
                 <a:ext uri="{91240B29-F687-4f45-9708-019B960494DF}">
-                  <a14:hiddenLine xmlns="" xmlns:a14="http://schemas.microsoft.com/office/drawing/2010/main" w="9525">
+                  <a14:hiddenLine xmlns:a14="http://schemas.microsoft.com/office/drawing/2010/main" xmlns="" w="9525">
                     <a:solidFill>
                       <a:srgbClr val="000000"/>
                     </a:solidFill>
@@ -11610,7 +11610,7 @@
               </a:ln>
               <a:extLst>
                 <a:ext uri="{91240B29-F687-4f45-9708-019B960494DF}">
-                  <a14:hiddenLine xmlns="" xmlns:a14="http://schemas.microsoft.com/office/drawing/2010/main" w="9525">
+                  <a14:hiddenLine xmlns:a14="http://schemas.microsoft.com/office/drawing/2010/main" xmlns="" w="9525">
                     <a:solidFill>
                       <a:srgbClr val="000000"/>
                     </a:solidFill>
@@ -11700,7 +11700,7 @@
               </a:ln>
               <a:extLst>
                 <a:ext uri="{91240B29-F687-4f45-9708-019B960494DF}">
-                  <a14:hiddenLine xmlns="" xmlns:a14="http://schemas.microsoft.com/office/drawing/2010/main" w="9525">
+                  <a14:hiddenLine xmlns:a14="http://schemas.microsoft.com/office/drawing/2010/main" xmlns="" w="9525">
                     <a:solidFill>
                       <a:srgbClr val="000000"/>
                     </a:solidFill>
@@ -11768,7 +11768,7 @@
               </a:ln>
               <a:extLst>
                 <a:ext uri="{91240B29-F687-4f45-9708-019B960494DF}">
-                  <a14:hiddenLine xmlns="" xmlns:a14="http://schemas.microsoft.com/office/drawing/2010/main" w="9525">
+                  <a14:hiddenLine xmlns:a14="http://schemas.microsoft.com/office/drawing/2010/main" xmlns="" w="9525">
                     <a:solidFill>
                       <a:srgbClr val="000000"/>
                     </a:solidFill>
@@ -11858,7 +11858,7 @@
               </a:ln>
               <a:extLst>
                 <a:ext uri="{91240B29-F687-4f45-9708-019B960494DF}">
-                  <a14:hiddenLine xmlns="" xmlns:a14="http://schemas.microsoft.com/office/drawing/2010/main" w="9525">
+                  <a14:hiddenLine xmlns:a14="http://schemas.microsoft.com/office/drawing/2010/main" xmlns="" w="9525">
                     <a:solidFill>
                       <a:srgbClr val="000000"/>
                     </a:solidFill>
@@ -11892,7 +11892,7 @@
               </a:ln>
               <a:extLst>
                 <a:ext uri="{91240B29-F687-4f45-9708-019B960494DF}">
-                  <a14:hiddenLine xmlns="" xmlns:a14="http://schemas.microsoft.com/office/drawing/2010/main" w="9525">
+                  <a14:hiddenLine xmlns:a14="http://schemas.microsoft.com/office/drawing/2010/main" xmlns="" w="9525">
                     <a:solidFill>
                       <a:srgbClr val="000000"/>
                     </a:solidFill>
@@ -13689,6 +13689,42 @@
           </a:p>
         </p:txBody>
       </p:sp>
+      <p:pic>
+        <p:nvPicPr>
+          <p:cNvPr id="4" name="Image 3">
+            <a:extLst>
+              <a:ext uri="{FF2B5EF4-FFF2-40B4-BE49-F238E27FC236}">
+                <a16:creationId xmlns:a16="http://schemas.microsoft.com/office/drawing/2014/main" id="{EFA54AED-7316-8D8B-FD8C-B54A7EE6A286}"/>
+              </a:ext>
+            </a:extLst>
+          </p:cNvPr>
+          <p:cNvPicPr>
+            <a:picLocks noChangeAspect="1"/>
+          </p:cNvPicPr>
+          <p:nvPr/>
+        </p:nvPicPr>
+        <p:blipFill>
+          <a:blip r:embed="rId2">
+            <a:extLst>
+              <a:ext uri="{28A0092B-C50C-407E-A947-70E740481C1C}">
+                <a14:useLocalDpi xmlns:a14="http://schemas.microsoft.com/office/drawing/2010/main" val="0"/>
+              </a:ext>
+            </a:extLst>
+          </a:blip>
+          <a:stretch>
+            <a:fillRect/>
+          </a:stretch>
+        </p:blipFill>
+        <p:spPr>
+          <a:xfrm>
+            <a:off x="335998" y="1924229"/>
+            <a:ext cx="11520000" cy="3738000"/>
+          </a:xfrm>
+          <a:prstGeom prst="rect">
+            <a:avLst/>
+          </a:prstGeom>
+        </p:spPr>
+      </p:pic>
     </p:spTree>
     <p:extLst>
       <p:ext uri="{BB962C8B-B14F-4D97-AF65-F5344CB8AC3E}">

</xml_diff>

<commit_message>
small modif about load screenshot
</commit_message>
<xml_diff>
--- a/rapport/VLSI-project-pres.pptx
+++ b/rapport/VLSI-project-pres.pptx
@@ -179,7 +179,7 @@
           <a:noFill/>
           <a:extLst>
             <a:ext uri="{909E8E84-426E-40dd-AFC4-6F175D3DCCD1}">
-              <a14:hiddenFill xmlns="" xmlns:a14="http://schemas.microsoft.com/office/drawing/2010/main">
+              <a14:hiddenFill xmlns:a14="http://schemas.microsoft.com/office/drawing/2010/main" xmlns="">
                 <a:solidFill>
                   <a:srgbClr val="FFFFFF"/>
                 </a:solidFill>
@@ -239,7 +239,7 @@
             </a:ln>
             <a:extLst>
               <a:ext uri="{91240B29-F687-4f45-9708-019B960494DF}">
-                <a14:hiddenLine xmlns="" xmlns:a14="http://schemas.microsoft.com/office/drawing/2010/main" w="9525">
+                <a14:hiddenLine xmlns:a14="http://schemas.microsoft.com/office/drawing/2010/main" xmlns="" w="9525">
                   <a:solidFill>
                     <a:srgbClr val="000000"/>
                   </a:solidFill>
@@ -329,7 +329,7 @@
             </a:ln>
             <a:extLst>
               <a:ext uri="{91240B29-F687-4f45-9708-019B960494DF}">
-                <a14:hiddenLine xmlns="" xmlns:a14="http://schemas.microsoft.com/office/drawing/2010/main" w="9525">
+                <a14:hiddenLine xmlns:a14="http://schemas.microsoft.com/office/drawing/2010/main" xmlns="" w="9525">
                   <a:solidFill>
                     <a:srgbClr val="000000"/>
                   </a:solidFill>
@@ -419,7 +419,7 @@
             </a:ln>
             <a:extLst>
               <a:ext uri="{91240B29-F687-4f45-9708-019B960494DF}">
-                <a14:hiddenLine xmlns="" xmlns:a14="http://schemas.microsoft.com/office/drawing/2010/main" w="9525">
+                <a14:hiddenLine xmlns:a14="http://schemas.microsoft.com/office/drawing/2010/main" xmlns="" w="9525">
                   <a:solidFill>
                     <a:srgbClr val="000000"/>
                   </a:solidFill>
@@ -453,7 +453,7 @@
             </a:ln>
             <a:extLst>
               <a:ext uri="{91240B29-F687-4f45-9708-019B960494DF}">
-                <a14:hiddenLine xmlns="" xmlns:a14="http://schemas.microsoft.com/office/drawing/2010/main" w="9525">
+                <a14:hiddenLine xmlns:a14="http://schemas.microsoft.com/office/drawing/2010/main" xmlns="" w="9525">
                   <a:solidFill>
                     <a:srgbClr val="000000"/>
                   </a:solidFill>
@@ -543,7 +543,7 @@
             </a:ln>
             <a:extLst>
               <a:ext uri="{91240B29-F687-4f45-9708-019B960494DF}">
-                <a14:hiddenLine xmlns="" xmlns:a14="http://schemas.microsoft.com/office/drawing/2010/main" w="9525">
+                <a14:hiddenLine xmlns:a14="http://schemas.microsoft.com/office/drawing/2010/main" xmlns="" w="9525">
                   <a:solidFill>
                     <a:srgbClr val="000000"/>
                   </a:solidFill>
@@ -605,7 +605,7 @@
             </a:ln>
             <a:extLst>
               <a:ext uri="{91240B29-F687-4f45-9708-019B960494DF}">
-                <a14:hiddenLine xmlns="" xmlns:a14="http://schemas.microsoft.com/office/drawing/2010/main" w="9525">
+                <a14:hiddenLine xmlns:a14="http://schemas.microsoft.com/office/drawing/2010/main" xmlns="" w="9525">
                   <a:solidFill>
                     <a:srgbClr val="000000"/>
                   </a:solidFill>
@@ -667,7 +667,7 @@
             </a:ln>
             <a:extLst>
               <a:ext uri="{91240B29-F687-4f45-9708-019B960494DF}">
-                <a14:hiddenLine xmlns="" xmlns:a14="http://schemas.microsoft.com/office/drawing/2010/main" w="9525">
+                <a14:hiddenLine xmlns:a14="http://schemas.microsoft.com/office/drawing/2010/main" xmlns="" w="9525">
                   <a:solidFill>
                     <a:srgbClr val="000000"/>
                   </a:solidFill>
@@ -757,7 +757,7 @@
             </a:ln>
             <a:extLst>
               <a:ext uri="{91240B29-F687-4f45-9708-019B960494DF}">
-                <a14:hiddenLine xmlns="" xmlns:a14="http://schemas.microsoft.com/office/drawing/2010/main" w="9525">
+                <a14:hiddenLine xmlns:a14="http://schemas.microsoft.com/office/drawing/2010/main" xmlns="" w="9525">
                   <a:solidFill>
                     <a:srgbClr val="000000"/>
                   </a:solidFill>
@@ -819,7 +819,7 @@
             </a:ln>
             <a:extLst>
               <a:ext uri="{91240B29-F687-4f45-9708-019B960494DF}">
-                <a14:hiddenLine xmlns="" xmlns:a14="http://schemas.microsoft.com/office/drawing/2010/main" w="9525">
+                <a14:hiddenLine xmlns:a14="http://schemas.microsoft.com/office/drawing/2010/main" xmlns="" w="9525">
                   <a:solidFill>
                     <a:srgbClr val="000000"/>
                   </a:solidFill>
@@ -881,7 +881,7 @@
             </a:ln>
             <a:extLst>
               <a:ext uri="{91240B29-F687-4f45-9708-019B960494DF}">
-                <a14:hiddenLine xmlns="" xmlns:a14="http://schemas.microsoft.com/office/drawing/2010/main" w="9525">
+                <a14:hiddenLine xmlns:a14="http://schemas.microsoft.com/office/drawing/2010/main" xmlns="" w="9525">
                   <a:solidFill>
                     <a:srgbClr val="000000"/>
                   </a:solidFill>
@@ -971,7 +971,7 @@
             </a:ln>
             <a:extLst>
               <a:ext uri="{91240B29-F687-4f45-9708-019B960494DF}">
-                <a14:hiddenLine xmlns="" xmlns:a14="http://schemas.microsoft.com/office/drawing/2010/main" w="9525">
+                <a14:hiddenLine xmlns:a14="http://schemas.microsoft.com/office/drawing/2010/main" xmlns="" w="9525">
                   <a:solidFill>
                     <a:srgbClr val="000000"/>
                   </a:solidFill>
@@ -1061,7 +1061,7 @@
             </a:ln>
             <a:extLst>
               <a:ext uri="{91240B29-F687-4f45-9708-019B960494DF}">
-                <a14:hiddenLine xmlns="" xmlns:a14="http://schemas.microsoft.com/office/drawing/2010/main" w="9525">
+                <a14:hiddenLine xmlns:a14="http://schemas.microsoft.com/office/drawing/2010/main" xmlns="" w="9525">
                   <a:solidFill>
                     <a:srgbClr val="000000"/>
                   </a:solidFill>
@@ -1123,7 +1123,7 @@
             </a:ln>
             <a:extLst>
               <a:ext uri="{91240B29-F687-4f45-9708-019B960494DF}">
-                <a14:hiddenLine xmlns="" xmlns:a14="http://schemas.microsoft.com/office/drawing/2010/main" w="9525">
+                <a14:hiddenLine xmlns:a14="http://schemas.microsoft.com/office/drawing/2010/main" xmlns="" w="9525">
                   <a:solidFill>
                     <a:srgbClr val="000000"/>
                   </a:solidFill>
@@ -1233,7 +1233,7 @@
             </a:ln>
             <a:extLst>
               <a:ext uri="{91240B29-F687-4f45-9708-019B960494DF}">
-                <a14:hiddenLine xmlns="" xmlns:a14="http://schemas.microsoft.com/office/drawing/2010/main" w="9525">
+                <a14:hiddenLine xmlns:a14="http://schemas.microsoft.com/office/drawing/2010/main" xmlns="" w="9525">
                   <a:solidFill>
                     <a:srgbClr val="000000"/>
                   </a:solidFill>
@@ -1295,7 +1295,7 @@
             </a:ln>
             <a:extLst>
               <a:ext uri="{91240B29-F687-4f45-9708-019B960494DF}">
-                <a14:hiddenLine xmlns="" xmlns:a14="http://schemas.microsoft.com/office/drawing/2010/main" w="9525">
+                <a14:hiddenLine xmlns:a14="http://schemas.microsoft.com/office/drawing/2010/main" xmlns="" w="9525">
                   <a:solidFill>
                     <a:srgbClr val="000000"/>
                   </a:solidFill>
@@ -1385,7 +1385,7 @@
             </a:ln>
             <a:extLst>
               <a:ext uri="{91240B29-F687-4f45-9708-019B960494DF}">
-                <a14:hiddenLine xmlns="" xmlns:a14="http://schemas.microsoft.com/office/drawing/2010/main" w="9525">
+                <a14:hiddenLine xmlns:a14="http://schemas.microsoft.com/office/drawing/2010/main" xmlns="" w="9525">
                   <a:solidFill>
                     <a:srgbClr val="000000"/>
                   </a:solidFill>
@@ -1475,7 +1475,7 @@
             </a:ln>
             <a:extLst>
               <a:ext uri="{91240B29-F687-4f45-9708-019B960494DF}">
-                <a14:hiddenLine xmlns="" xmlns:a14="http://schemas.microsoft.com/office/drawing/2010/main" w="9525">
+                <a14:hiddenLine xmlns:a14="http://schemas.microsoft.com/office/drawing/2010/main" xmlns="" w="9525">
                   <a:solidFill>
                     <a:srgbClr val="000000"/>
                   </a:solidFill>
@@ -1537,7 +1537,7 @@
             </a:ln>
             <a:extLst>
               <a:ext uri="{91240B29-F687-4f45-9708-019B960494DF}">
-                <a14:hiddenLine xmlns="" xmlns:a14="http://schemas.microsoft.com/office/drawing/2010/main" w="9525">
+                <a14:hiddenLine xmlns:a14="http://schemas.microsoft.com/office/drawing/2010/main" xmlns="" w="9525">
                   <a:solidFill>
                     <a:srgbClr val="000000"/>
                   </a:solidFill>
@@ -1627,7 +1627,7 @@
             </a:ln>
             <a:extLst>
               <a:ext uri="{91240B29-F687-4f45-9708-019B960494DF}">
-                <a14:hiddenLine xmlns="" xmlns:a14="http://schemas.microsoft.com/office/drawing/2010/main" w="9525">
+                <a14:hiddenLine xmlns:a14="http://schemas.microsoft.com/office/drawing/2010/main" xmlns="" w="9525">
                   <a:solidFill>
                     <a:srgbClr val="000000"/>
                   </a:solidFill>
@@ -1717,7 +1717,7 @@
             </a:ln>
             <a:extLst>
               <a:ext uri="{91240B29-F687-4f45-9708-019B960494DF}">
-                <a14:hiddenLine xmlns="" xmlns:a14="http://schemas.microsoft.com/office/drawing/2010/main" w="9525">
+                <a14:hiddenLine xmlns:a14="http://schemas.microsoft.com/office/drawing/2010/main" xmlns="" w="9525">
                   <a:solidFill>
                     <a:srgbClr val="000000"/>
                   </a:solidFill>
@@ -1773,7 +1773,7 @@
             </a:ln>
             <a:extLst>
               <a:ext uri="{91240B29-F687-4f45-9708-019B960494DF}">
-                <a14:hiddenLine xmlns="" xmlns:a14="http://schemas.microsoft.com/office/drawing/2010/main" w="9525">
+                <a14:hiddenLine xmlns:a14="http://schemas.microsoft.com/office/drawing/2010/main" xmlns="" w="9525">
                   <a:solidFill>
                     <a:srgbClr val="000000"/>
                   </a:solidFill>
@@ -1863,7 +1863,7 @@
             </a:ln>
             <a:extLst>
               <a:ext uri="{91240B29-F687-4f45-9708-019B960494DF}">
-                <a14:hiddenLine xmlns="" xmlns:a14="http://schemas.microsoft.com/office/drawing/2010/main" w="9525">
+                <a14:hiddenLine xmlns:a14="http://schemas.microsoft.com/office/drawing/2010/main" xmlns="" w="9525">
                   <a:solidFill>
                     <a:srgbClr val="000000"/>
                   </a:solidFill>
@@ -1919,7 +1919,7 @@
             </a:ln>
             <a:extLst>
               <a:ext uri="{91240B29-F687-4f45-9708-019B960494DF}">
-                <a14:hiddenLine xmlns="" xmlns:a14="http://schemas.microsoft.com/office/drawing/2010/main" w="9525">
+                <a14:hiddenLine xmlns:a14="http://schemas.microsoft.com/office/drawing/2010/main" xmlns="" w="9525">
                   <a:solidFill>
                     <a:srgbClr val="000000"/>
                   </a:solidFill>
@@ -2009,7 +2009,7 @@
             </a:ln>
             <a:extLst>
               <a:ext uri="{91240B29-F687-4f45-9708-019B960494DF}">
-                <a14:hiddenLine xmlns="" xmlns:a14="http://schemas.microsoft.com/office/drawing/2010/main" w="9525">
+                <a14:hiddenLine xmlns:a14="http://schemas.microsoft.com/office/drawing/2010/main" xmlns="" w="9525">
                   <a:solidFill>
                     <a:srgbClr val="000000"/>
                   </a:solidFill>
@@ -2077,7 +2077,7 @@
             </a:ln>
             <a:extLst>
               <a:ext uri="{91240B29-F687-4f45-9708-019B960494DF}">
-                <a14:hiddenLine xmlns="" xmlns:a14="http://schemas.microsoft.com/office/drawing/2010/main" w="9525">
+                <a14:hiddenLine xmlns:a14="http://schemas.microsoft.com/office/drawing/2010/main" xmlns="" w="9525">
                   <a:solidFill>
                     <a:srgbClr val="000000"/>
                   </a:solidFill>
@@ -2167,7 +2167,7 @@
             </a:ln>
             <a:extLst>
               <a:ext uri="{91240B29-F687-4f45-9708-019B960494DF}">
-                <a14:hiddenLine xmlns="" xmlns:a14="http://schemas.microsoft.com/office/drawing/2010/main" w="9525">
+                <a14:hiddenLine xmlns:a14="http://schemas.microsoft.com/office/drawing/2010/main" xmlns="" w="9525">
                   <a:solidFill>
                     <a:srgbClr val="000000"/>
                   </a:solidFill>
@@ -2235,7 +2235,7 @@
             </a:ln>
             <a:extLst>
               <a:ext uri="{91240B29-F687-4f45-9708-019B960494DF}">
-                <a14:hiddenLine xmlns="" xmlns:a14="http://schemas.microsoft.com/office/drawing/2010/main" w="9525">
+                <a14:hiddenLine xmlns:a14="http://schemas.microsoft.com/office/drawing/2010/main" xmlns="" w="9525">
                   <a:solidFill>
                     <a:srgbClr val="000000"/>
                   </a:solidFill>
@@ -2325,7 +2325,7 @@
             </a:ln>
             <a:extLst>
               <a:ext uri="{91240B29-F687-4f45-9708-019B960494DF}">
-                <a14:hiddenLine xmlns="" xmlns:a14="http://schemas.microsoft.com/office/drawing/2010/main" w="9525">
+                <a14:hiddenLine xmlns:a14="http://schemas.microsoft.com/office/drawing/2010/main" xmlns="" w="9525">
                   <a:solidFill>
                     <a:srgbClr val="000000"/>
                   </a:solidFill>
@@ -2359,7 +2359,7 @@
             </a:ln>
             <a:extLst>
               <a:ext uri="{91240B29-F687-4f45-9708-019B960494DF}">
-                <a14:hiddenLine xmlns="" xmlns:a14="http://schemas.microsoft.com/office/drawing/2010/main" w="9525">
+                <a14:hiddenLine xmlns:a14="http://schemas.microsoft.com/office/drawing/2010/main" xmlns="" w="9525">
                   <a:solidFill>
                     <a:srgbClr val="000000"/>
                   </a:solidFill>
@@ -2449,7 +2449,7 @@
             </a:ln>
             <a:extLst>
               <a:ext uri="{91240B29-F687-4f45-9708-019B960494DF}">
-                <a14:hiddenLine xmlns="" xmlns:a14="http://schemas.microsoft.com/office/drawing/2010/main" w="9525">
+                <a14:hiddenLine xmlns:a14="http://schemas.microsoft.com/office/drawing/2010/main" xmlns="" w="9525">
                   <a:solidFill>
                     <a:srgbClr val="000000"/>
                   </a:solidFill>
@@ -2511,7 +2511,7 @@
             </a:ln>
             <a:extLst>
               <a:ext uri="{91240B29-F687-4f45-9708-019B960494DF}">
-                <a14:hiddenLine xmlns="" xmlns:a14="http://schemas.microsoft.com/office/drawing/2010/main" w="9525">
+                <a14:hiddenLine xmlns:a14="http://schemas.microsoft.com/office/drawing/2010/main" xmlns="" w="9525">
                   <a:solidFill>
                     <a:srgbClr val="000000"/>
                   </a:solidFill>
@@ -2573,7 +2573,7 @@
             </a:ln>
             <a:extLst>
               <a:ext uri="{91240B29-F687-4f45-9708-019B960494DF}">
-                <a14:hiddenLine xmlns="" xmlns:a14="http://schemas.microsoft.com/office/drawing/2010/main" w="9525">
+                <a14:hiddenLine xmlns:a14="http://schemas.microsoft.com/office/drawing/2010/main" xmlns="" w="9525">
                   <a:solidFill>
                     <a:srgbClr val="000000"/>
                   </a:solidFill>
@@ -2663,7 +2663,7 @@
             </a:ln>
             <a:extLst>
               <a:ext uri="{91240B29-F687-4f45-9708-019B960494DF}">
-                <a14:hiddenLine xmlns="" xmlns:a14="http://schemas.microsoft.com/office/drawing/2010/main" w="9525">
+                <a14:hiddenLine xmlns:a14="http://schemas.microsoft.com/office/drawing/2010/main" xmlns="" w="9525">
                   <a:solidFill>
                     <a:srgbClr val="000000"/>
                   </a:solidFill>
@@ -2731,7 +2731,7 @@
             </a:ln>
             <a:extLst>
               <a:ext uri="{91240B29-F687-4f45-9708-019B960494DF}">
-                <a14:hiddenLine xmlns="" xmlns:a14="http://schemas.microsoft.com/office/drawing/2010/main" w="9525">
+                <a14:hiddenLine xmlns:a14="http://schemas.microsoft.com/office/drawing/2010/main" xmlns="" w="9525">
                   <a:solidFill>
                     <a:srgbClr val="000000"/>
                   </a:solidFill>
@@ -2793,7 +2793,7 @@
             </a:ln>
             <a:extLst>
               <a:ext uri="{91240B29-F687-4f45-9708-019B960494DF}">
-                <a14:hiddenLine xmlns="" xmlns:a14="http://schemas.microsoft.com/office/drawing/2010/main" w="9525">
+                <a14:hiddenLine xmlns:a14="http://schemas.microsoft.com/office/drawing/2010/main" xmlns="" w="9525">
                   <a:solidFill>
                     <a:srgbClr val="000000"/>
                   </a:solidFill>
@@ -2883,7 +2883,7 @@
             </a:ln>
             <a:extLst>
               <a:ext uri="{91240B29-F687-4f45-9708-019B960494DF}">
-                <a14:hiddenLine xmlns="" xmlns:a14="http://schemas.microsoft.com/office/drawing/2010/main" w="9525">
+                <a14:hiddenLine xmlns:a14="http://schemas.microsoft.com/office/drawing/2010/main" xmlns="" w="9525">
                   <a:solidFill>
                     <a:srgbClr val="000000"/>
                   </a:solidFill>
@@ -2945,7 +2945,7 @@
             </a:ln>
             <a:extLst>
               <a:ext uri="{91240B29-F687-4f45-9708-019B960494DF}">
-                <a14:hiddenLine xmlns="" xmlns:a14="http://schemas.microsoft.com/office/drawing/2010/main" w="9525">
+                <a14:hiddenLine xmlns:a14="http://schemas.microsoft.com/office/drawing/2010/main" xmlns="" w="9525">
                   <a:solidFill>
                     <a:srgbClr val="000000"/>
                   </a:solidFill>
@@ -3035,7 +3035,7 @@
             </a:ln>
             <a:extLst>
               <a:ext uri="{91240B29-F687-4f45-9708-019B960494DF}">
-                <a14:hiddenLine xmlns="" xmlns:a14="http://schemas.microsoft.com/office/drawing/2010/main" w="9525">
+                <a14:hiddenLine xmlns:a14="http://schemas.microsoft.com/office/drawing/2010/main" xmlns="" w="9525">
                   <a:solidFill>
                     <a:srgbClr val="000000"/>
                   </a:solidFill>
@@ -3097,7 +3097,7 @@
             </a:ln>
             <a:extLst>
               <a:ext uri="{91240B29-F687-4f45-9708-019B960494DF}">
-                <a14:hiddenLine xmlns="" xmlns:a14="http://schemas.microsoft.com/office/drawing/2010/main" w="9525">
+                <a14:hiddenLine xmlns:a14="http://schemas.microsoft.com/office/drawing/2010/main" xmlns="" w="9525">
                   <a:solidFill>
                     <a:srgbClr val="000000"/>
                   </a:solidFill>
@@ -3187,7 +3187,7 @@
             </a:ln>
             <a:extLst>
               <a:ext uri="{91240B29-F687-4f45-9708-019B960494DF}">
-                <a14:hiddenLine xmlns="" xmlns:a14="http://schemas.microsoft.com/office/drawing/2010/main" w="9525">
+                <a14:hiddenLine xmlns:a14="http://schemas.microsoft.com/office/drawing/2010/main" xmlns="" w="9525">
                   <a:solidFill>
                     <a:srgbClr val="000000"/>
                   </a:solidFill>
@@ -3221,7 +3221,7 @@
             </a:ln>
             <a:extLst>
               <a:ext uri="{91240B29-F687-4f45-9708-019B960494DF}">
-                <a14:hiddenLine xmlns="" xmlns:a14="http://schemas.microsoft.com/office/drawing/2010/main" w="9525">
+                <a14:hiddenLine xmlns:a14="http://schemas.microsoft.com/office/drawing/2010/main" xmlns="" w="9525">
                   <a:solidFill>
                     <a:srgbClr val="000000"/>
                   </a:solidFill>
@@ -3286,7 +3286,7 @@
             </a:ln>
             <a:extLst>
               <a:ext uri="{91240B29-F687-4f45-9708-019B960494DF}">
-                <a14:hiddenLine xmlns="" xmlns:a14="http://schemas.microsoft.com/office/drawing/2010/main" w="9525">
+                <a14:hiddenLine xmlns:a14="http://schemas.microsoft.com/office/drawing/2010/main" xmlns="" w="9525">
                   <a:solidFill>
                     <a:srgbClr val="000000"/>
                   </a:solidFill>
@@ -3376,7 +3376,7 @@
             </a:ln>
             <a:extLst>
               <a:ext uri="{91240B29-F687-4f45-9708-019B960494DF}">
-                <a14:hiddenLine xmlns="" xmlns:a14="http://schemas.microsoft.com/office/drawing/2010/main" w="9525">
+                <a14:hiddenLine xmlns:a14="http://schemas.microsoft.com/office/drawing/2010/main" xmlns="" w="9525">
                   <a:solidFill>
                     <a:srgbClr val="000000"/>
                   </a:solidFill>
@@ -3438,7 +3438,7 @@
             </a:ln>
             <a:extLst>
               <a:ext uri="{91240B29-F687-4f45-9708-019B960494DF}">
-                <a14:hiddenLine xmlns="" xmlns:a14="http://schemas.microsoft.com/office/drawing/2010/main" w="9525">
+                <a14:hiddenLine xmlns:a14="http://schemas.microsoft.com/office/drawing/2010/main" xmlns="" w="9525">
                   <a:solidFill>
                     <a:srgbClr val="000000"/>
                   </a:solidFill>
@@ -3528,7 +3528,7 @@
             </a:ln>
             <a:extLst>
               <a:ext uri="{91240B29-F687-4f45-9708-019B960494DF}">
-                <a14:hiddenLine xmlns="" xmlns:a14="http://schemas.microsoft.com/office/drawing/2010/main" w="9525">
+                <a14:hiddenLine xmlns:a14="http://schemas.microsoft.com/office/drawing/2010/main" xmlns="" w="9525">
                   <a:solidFill>
                     <a:srgbClr val="000000"/>
                   </a:solidFill>
@@ -3618,7 +3618,7 @@
             </a:ln>
             <a:extLst>
               <a:ext uri="{91240B29-F687-4f45-9708-019B960494DF}">
-                <a14:hiddenLine xmlns="" xmlns:a14="http://schemas.microsoft.com/office/drawing/2010/main" w="9525">
+                <a14:hiddenLine xmlns:a14="http://schemas.microsoft.com/office/drawing/2010/main" xmlns="" w="9525">
                   <a:solidFill>
                     <a:srgbClr val="000000"/>
                   </a:solidFill>
@@ -3683,7 +3683,7 @@
             </a:ln>
             <a:extLst>
               <a:ext uri="{91240B29-F687-4f45-9708-019B960494DF}">
-                <a14:hiddenLine xmlns="" xmlns:a14="http://schemas.microsoft.com/office/drawing/2010/main" w="9525">
+                <a14:hiddenLine xmlns:a14="http://schemas.microsoft.com/office/drawing/2010/main" xmlns="" w="9525">
                   <a:solidFill>
                     <a:srgbClr val="000000"/>
                   </a:solidFill>
@@ -3745,7 +3745,7 @@
             </a:ln>
             <a:extLst>
               <a:ext uri="{91240B29-F687-4f45-9708-019B960494DF}">
-                <a14:hiddenLine xmlns="" xmlns:a14="http://schemas.microsoft.com/office/drawing/2010/main" w="9525">
+                <a14:hiddenLine xmlns:a14="http://schemas.microsoft.com/office/drawing/2010/main" xmlns="" w="9525">
                   <a:solidFill>
                     <a:srgbClr val="000000"/>
                   </a:solidFill>
@@ -3835,7 +3835,7 @@
             </a:ln>
             <a:extLst>
               <a:ext uri="{91240B29-F687-4f45-9708-019B960494DF}">
-                <a14:hiddenLine xmlns="" xmlns:a14="http://schemas.microsoft.com/office/drawing/2010/main" w="9525">
+                <a14:hiddenLine xmlns:a14="http://schemas.microsoft.com/office/drawing/2010/main" xmlns="" w="9525">
                   <a:solidFill>
                     <a:srgbClr val="000000"/>
                   </a:solidFill>
@@ -3925,7 +3925,7 @@
             </a:ln>
             <a:extLst>
               <a:ext uri="{91240B29-F687-4f45-9708-019B960494DF}">
-                <a14:hiddenLine xmlns="" xmlns:a14="http://schemas.microsoft.com/office/drawing/2010/main" w="9525">
+                <a14:hiddenLine xmlns:a14="http://schemas.microsoft.com/office/drawing/2010/main" xmlns="" w="9525">
                   <a:solidFill>
                     <a:srgbClr val="000000"/>
                   </a:solidFill>
@@ -3987,7 +3987,7 @@
             </a:ln>
             <a:extLst>
               <a:ext uri="{91240B29-F687-4f45-9708-019B960494DF}">
-                <a14:hiddenLine xmlns="" xmlns:a14="http://schemas.microsoft.com/office/drawing/2010/main" w="9525">
+                <a14:hiddenLine xmlns:a14="http://schemas.microsoft.com/office/drawing/2010/main" xmlns="" w="9525">
                   <a:solidFill>
                     <a:srgbClr val="000000"/>
                   </a:solidFill>
@@ -4107,7 +4107,7 @@
             </a:ln>
             <a:extLst>
               <a:ext uri="{91240B29-F687-4f45-9708-019B960494DF}">
-                <a14:hiddenLine xmlns="" xmlns:a14="http://schemas.microsoft.com/office/drawing/2010/main" w="9525">
+                <a14:hiddenLine xmlns:a14="http://schemas.microsoft.com/office/drawing/2010/main" xmlns="" w="9525">
                   <a:solidFill>
                     <a:srgbClr val="000000"/>
                   </a:solidFill>
@@ -4175,7 +4175,7 @@
             </a:ln>
             <a:extLst>
               <a:ext uri="{91240B29-F687-4f45-9708-019B960494DF}">
-                <a14:hiddenLine xmlns="" xmlns:a14="http://schemas.microsoft.com/office/drawing/2010/main" w="9525">
+                <a14:hiddenLine xmlns:a14="http://schemas.microsoft.com/office/drawing/2010/main" xmlns="" w="9525">
                   <a:solidFill>
                     <a:srgbClr val="000000"/>
                   </a:solidFill>
@@ -4265,7 +4265,7 @@
             </a:ln>
             <a:extLst>
               <a:ext uri="{91240B29-F687-4f45-9708-019B960494DF}">
-                <a14:hiddenLine xmlns="" xmlns:a14="http://schemas.microsoft.com/office/drawing/2010/main" w="9525">
+                <a14:hiddenLine xmlns:a14="http://schemas.microsoft.com/office/drawing/2010/main" xmlns="" w="9525">
                   <a:solidFill>
                     <a:srgbClr val="000000"/>
                   </a:solidFill>
@@ -4405,7 +4405,7 @@
           <a:p>
             <a:fld id="{1844080F-E185-4B6D-9F8A-4CFCF0F63975}" type="datetimeFigureOut">
               <a:rPr lang="fr-FR" smtClean="0"/>
-              <a:t>15/01/2025</a:t>
+              <a:t>16/01/2025</a:t>
             </a:fld>
             <a:endParaRPr lang="fr-FR"/>
           </a:p>
@@ -4672,7 +4672,7 @@
           <a:p>
             <a:fld id="{1844080F-E185-4B6D-9F8A-4CFCF0F63975}" type="datetimeFigureOut">
               <a:rPr lang="fr-FR" smtClean="0"/>
-              <a:t>15/01/2025</a:t>
+              <a:t>16/01/2025</a:t>
             </a:fld>
             <a:endParaRPr lang="fr-FR"/>
           </a:p>
@@ -4868,7 +4868,7 @@
           <a:p>
             <a:fld id="{1844080F-E185-4B6D-9F8A-4CFCF0F63975}" type="datetimeFigureOut">
               <a:rPr lang="fr-FR" smtClean="0"/>
-              <a:t>15/01/2025</a:t>
+              <a:t>16/01/2025</a:t>
             </a:fld>
             <a:endParaRPr lang="fr-FR"/>
           </a:p>
@@ -5131,7 +5131,7 @@
           <a:p>
             <a:fld id="{1844080F-E185-4B6D-9F8A-4CFCF0F63975}" type="datetimeFigureOut">
               <a:rPr lang="fr-FR" smtClean="0"/>
-              <a:t>15/01/2025</a:t>
+              <a:t>16/01/2025</a:t>
             </a:fld>
             <a:endParaRPr lang="fr-FR"/>
           </a:p>
@@ -5565,7 +5565,7 @@
           <a:p>
             <a:fld id="{1844080F-E185-4B6D-9F8A-4CFCF0F63975}" type="datetimeFigureOut">
               <a:rPr lang="fr-FR" smtClean="0"/>
-              <a:t>15/01/2025</a:t>
+              <a:t>16/01/2025</a:t>
             </a:fld>
             <a:endParaRPr lang="fr-FR"/>
           </a:p>
@@ -6111,7 +6111,7 @@
           <a:p>
             <a:fld id="{1844080F-E185-4B6D-9F8A-4CFCF0F63975}" type="datetimeFigureOut">
               <a:rPr lang="fr-FR" smtClean="0"/>
-              <a:t>15/01/2025</a:t>
+              <a:t>16/01/2025</a:t>
             </a:fld>
             <a:endParaRPr lang="fr-FR"/>
           </a:p>
@@ -6831,7 +6831,7 @@
           <a:p>
             <a:fld id="{1844080F-E185-4B6D-9F8A-4CFCF0F63975}" type="datetimeFigureOut">
               <a:rPr lang="fr-FR" smtClean="0"/>
-              <a:t>15/01/2025</a:t>
+              <a:t>16/01/2025</a:t>
             </a:fld>
             <a:endParaRPr lang="fr-FR"/>
           </a:p>
@@ -7001,7 +7001,7 @@
           <a:p>
             <a:fld id="{1844080F-E185-4B6D-9F8A-4CFCF0F63975}" type="datetimeFigureOut">
               <a:rPr lang="fr-FR" smtClean="0"/>
-              <a:t>15/01/2025</a:t>
+              <a:t>16/01/2025</a:t>
             </a:fld>
             <a:endParaRPr lang="fr-FR"/>
           </a:p>
@@ -7181,7 +7181,7 @@
           <a:p>
             <a:fld id="{1844080F-E185-4B6D-9F8A-4CFCF0F63975}" type="datetimeFigureOut">
               <a:rPr lang="fr-FR" smtClean="0"/>
-              <a:t>15/01/2025</a:t>
+              <a:t>16/01/2025</a:t>
             </a:fld>
             <a:endParaRPr lang="fr-FR"/>
           </a:p>
@@ -7351,7 +7351,7 @@
           <a:p>
             <a:fld id="{1844080F-E185-4B6D-9F8A-4CFCF0F63975}" type="datetimeFigureOut">
               <a:rPr lang="fr-FR" smtClean="0"/>
-              <a:t>15/01/2025</a:t>
+              <a:t>16/01/2025</a:t>
             </a:fld>
             <a:endParaRPr lang="fr-FR"/>
           </a:p>
@@ -7601,7 +7601,7 @@
           <a:p>
             <a:fld id="{1844080F-E185-4B6D-9F8A-4CFCF0F63975}" type="datetimeFigureOut">
               <a:rPr lang="fr-FR" smtClean="0"/>
-              <a:t>15/01/2025</a:t>
+              <a:t>16/01/2025</a:t>
             </a:fld>
             <a:endParaRPr lang="fr-FR"/>
           </a:p>
@@ -7833,7 +7833,7 @@
           <a:p>
             <a:fld id="{1844080F-E185-4B6D-9F8A-4CFCF0F63975}" type="datetimeFigureOut">
               <a:rPr lang="fr-FR" smtClean="0"/>
-              <a:t>15/01/2025</a:t>
+              <a:t>16/01/2025</a:t>
             </a:fld>
             <a:endParaRPr lang="fr-FR"/>
           </a:p>
@@ -8214,7 +8214,7 @@
           <a:p>
             <a:fld id="{1844080F-E185-4B6D-9F8A-4CFCF0F63975}" type="datetimeFigureOut">
               <a:rPr lang="fr-FR" smtClean="0"/>
-              <a:t>15/01/2025</a:t>
+              <a:t>16/01/2025</a:t>
             </a:fld>
             <a:endParaRPr lang="fr-FR"/>
           </a:p>
@@ -8332,7 +8332,7 @@
           <a:p>
             <a:fld id="{1844080F-E185-4B6D-9F8A-4CFCF0F63975}" type="datetimeFigureOut">
               <a:rPr lang="fr-FR" smtClean="0"/>
-              <a:t>15/01/2025</a:t>
+              <a:t>16/01/2025</a:t>
             </a:fld>
             <a:endParaRPr lang="fr-FR"/>
           </a:p>
@@ -8427,7 +8427,7 @@
           <a:p>
             <a:fld id="{1844080F-E185-4B6D-9F8A-4CFCF0F63975}" type="datetimeFigureOut">
               <a:rPr lang="fr-FR" smtClean="0"/>
-              <a:t>15/01/2025</a:t>
+              <a:t>16/01/2025</a:t>
             </a:fld>
             <a:endParaRPr lang="fr-FR"/>
           </a:p>
@@ -8676,7 +8676,7 @@
           <a:p>
             <a:fld id="{1844080F-E185-4B6D-9F8A-4CFCF0F63975}" type="datetimeFigureOut">
               <a:rPr lang="fr-FR" smtClean="0"/>
-              <a:t>15/01/2025</a:t>
+              <a:t>16/01/2025</a:t>
             </a:fld>
             <a:endParaRPr lang="fr-FR"/>
           </a:p>
@@ -8956,7 +8956,7 @@
           <a:p>
             <a:fld id="{1844080F-E185-4B6D-9F8A-4CFCF0F63975}" type="datetimeFigureOut">
               <a:rPr lang="fr-FR" smtClean="0"/>
-              <a:t>15/01/2025</a:t>
+              <a:t>16/01/2025</a:t>
             </a:fld>
             <a:endParaRPr lang="fr-FR"/>
           </a:p>
@@ -9072,7 +9072,7 @@
           <a:noFill/>
           <a:extLst>
             <a:ext uri="{909E8E84-426E-40dd-AFC4-6F175D3DCCD1}">
-              <a14:hiddenFill xmlns="" xmlns:a14="http://schemas.microsoft.com/office/drawing/2010/main">
+              <a14:hiddenFill xmlns:a14="http://schemas.microsoft.com/office/drawing/2010/main" xmlns="">
                 <a:solidFill>
                   <a:srgbClr val="FFFFFF"/>
                 </a:solidFill>
@@ -9146,7 +9146,7 @@
               </a:ln>
               <a:extLst>
                 <a:ext uri="{91240B29-F687-4f45-9708-019B960494DF}">
-                  <a14:hiddenLine xmlns="" xmlns:a14="http://schemas.microsoft.com/office/drawing/2010/main" w="9525">
+                  <a14:hiddenLine xmlns:a14="http://schemas.microsoft.com/office/drawing/2010/main" xmlns="" w="9525">
                     <a:solidFill>
                       <a:srgbClr val="000000"/>
                     </a:solidFill>
@@ -9236,7 +9236,7 @@
               </a:ln>
               <a:extLst>
                 <a:ext uri="{91240B29-F687-4f45-9708-019B960494DF}">
-                  <a14:hiddenLine xmlns="" xmlns:a14="http://schemas.microsoft.com/office/drawing/2010/main" w="9525">
+                  <a14:hiddenLine xmlns:a14="http://schemas.microsoft.com/office/drawing/2010/main" xmlns="" w="9525">
                     <a:solidFill>
                       <a:srgbClr val="000000"/>
                     </a:solidFill>
@@ -9326,7 +9326,7 @@
               </a:ln>
               <a:extLst>
                 <a:ext uri="{91240B29-F687-4f45-9708-019B960494DF}">
-                  <a14:hiddenLine xmlns="" xmlns:a14="http://schemas.microsoft.com/office/drawing/2010/main" w="9525">
+                  <a14:hiddenLine xmlns:a14="http://schemas.microsoft.com/office/drawing/2010/main" xmlns="" w="9525">
                     <a:solidFill>
                       <a:srgbClr val="000000"/>
                     </a:solidFill>
@@ -9388,7 +9388,7 @@
               </a:ln>
               <a:extLst>
                 <a:ext uri="{91240B29-F687-4f45-9708-019B960494DF}">
-                  <a14:hiddenLine xmlns="" xmlns:a14="http://schemas.microsoft.com/office/drawing/2010/main" w="9525">
+                  <a14:hiddenLine xmlns:a14="http://schemas.microsoft.com/office/drawing/2010/main" xmlns="" w="9525">
                     <a:solidFill>
                       <a:srgbClr val="000000"/>
                     </a:solidFill>
@@ -9478,7 +9478,7 @@
               </a:ln>
               <a:extLst>
                 <a:ext uri="{91240B29-F687-4f45-9708-019B960494DF}">
-                  <a14:hiddenLine xmlns="" xmlns:a14="http://schemas.microsoft.com/office/drawing/2010/main" w="9525">
+                  <a14:hiddenLine xmlns:a14="http://schemas.microsoft.com/office/drawing/2010/main" xmlns="" w="9525">
                     <a:solidFill>
                       <a:srgbClr val="000000"/>
                     </a:solidFill>
@@ -9540,7 +9540,7 @@
               </a:ln>
               <a:extLst>
                 <a:ext uri="{91240B29-F687-4f45-9708-019B960494DF}">
-                  <a14:hiddenLine xmlns="" xmlns:a14="http://schemas.microsoft.com/office/drawing/2010/main" w="9525">
+                  <a14:hiddenLine xmlns:a14="http://schemas.microsoft.com/office/drawing/2010/main" xmlns="" w="9525">
                     <a:solidFill>
                       <a:srgbClr val="000000"/>
                     </a:solidFill>
@@ -9602,7 +9602,7 @@
               </a:ln>
               <a:extLst>
                 <a:ext uri="{91240B29-F687-4f45-9708-019B960494DF}">
-                  <a14:hiddenLine xmlns="" xmlns:a14="http://schemas.microsoft.com/office/drawing/2010/main" w="9525">
+                  <a14:hiddenLine xmlns:a14="http://schemas.microsoft.com/office/drawing/2010/main" xmlns="" w="9525">
                     <a:solidFill>
                       <a:srgbClr val="000000"/>
                     </a:solidFill>
@@ -9692,7 +9692,7 @@
               </a:ln>
               <a:extLst>
                 <a:ext uri="{91240B29-F687-4f45-9708-019B960494DF}">
-                  <a14:hiddenLine xmlns="" xmlns:a14="http://schemas.microsoft.com/office/drawing/2010/main" w="9525">
+                  <a14:hiddenLine xmlns:a14="http://schemas.microsoft.com/office/drawing/2010/main" xmlns="" w="9525">
                     <a:solidFill>
                       <a:srgbClr val="000000"/>
                     </a:solidFill>
@@ -9782,7 +9782,7 @@
               </a:ln>
               <a:extLst>
                 <a:ext uri="{91240B29-F687-4f45-9708-019B960494DF}">
-                  <a14:hiddenLine xmlns="" xmlns:a14="http://schemas.microsoft.com/office/drawing/2010/main" w="9525">
+                  <a14:hiddenLine xmlns:a14="http://schemas.microsoft.com/office/drawing/2010/main" xmlns="" w="9525">
                     <a:solidFill>
                       <a:srgbClr val="000000"/>
                     </a:solidFill>
@@ -9844,7 +9844,7 @@
               </a:ln>
               <a:extLst>
                 <a:ext uri="{91240B29-F687-4f45-9708-019B960494DF}">
-                  <a14:hiddenLine xmlns="" xmlns:a14="http://schemas.microsoft.com/office/drawing/2010/main" w="9525">
+                  <a14:hiddenLine xmlns:a14="http://schemas.microsoft.com/office/drawing/2010/main" xmlns="" w="9525">
                     <a:solidFill>
                       <a:srgbClr val="000000"/>
                     </a:solidFill>
@@ -9954,7 +9954,7 @@
               </a:ln>
               <a:extLst>
                 <a:ext uri="{91240B29-F687-4f45-9708-019B960494DF}">
-                  <a14:hiddenLine xmlns="" xmlns:a14="http://schemas.microsoft.com/office/drawing/2010/main" w="9525">
+                  <a14:hiddenLine xmlns:a14="http://schemas.microsoft.com/office/drawing/2010/main" xmlns="" w="9525">
                     <a:solidFill>
                       <a:srgbClr val="000000"/>
                     </a:solidFill>
@@ -10038,7 +10038,7 @@
               </a:ln>
               <a:extLst>
                 <a:ext uri="{91240B29-F687-4f45-9708-019B960494DF}">
-                  <a14:hiddenLine xmlns="" xmlns:a14="http://schemas.microsoft.com/office/drawing/2010/main" w="9525">
+                  <a14:hiddenLine xmlns:a14="http://schemas.microsoft.com/office/drawing/2010/main" xmlns="" w="9525">
                     <a:solidFill>
                       <a:srgbClr val="000000"/>
                     </a:solidFill>
@@ -10100,7 +10100,7 @@
               </a:ln>
               <a:extLst>
                 <a:ext uri="{91240B29-F687-4f45-9708-019B960494DF}">
-                  <a14:hiddenLine xmlns="" xmlns:a14="http://schemas.microsoft.com/office/drawing/2010/main" w="9525">
+                  <a14:hiddenLine xmlns:a14="http://schemas.microsoft.com/office/drawing/2010/main" xmlns="" w="9525">
                     <a:solidFill>
                       <a:srgbClr val="000000"/>
                     </a:solidFill>
@@ -10162,7 +10162,7 @@
               </a:ln>
               <a:extLst>
                 <a:ext uri="{91240B29-F687-4f45-9708-019B960494DF}">
-                  <a14:hiddenLine xmlns="" xmlns:a14="http://schemas.microsoft.com/office/drawing/2010/main" w="9525">
+                  <a14:hiddenLine xmlns:a14="http://schemas.microsoft.com/office/drawing/2010/main" xmlns="" w="9525">
                     <a:solidFill>
                       <a:srgbClr val="000000"/>
                     </a:solidFill>
@@ -10252,7 +10252,7 @@
               </a:ln>
               <a:extLst>
                 <a:ext uri="{91240B29-F687-4f45-9708-019B960494DF}">
-                  <a14:hiddenLine xmlns="" xmlns:a14="http://schemas.microsoft.com/office/drawing/2010/main" w="9525">
+                  <a14:hiddenLine xmlns:a14="http://schemas.microsoft.com/office/drawing/2010/main" xmlns="" w="9525">
                     <a:solidFill>
                       <a:srgbClr val="000000"/>
                     </a:solidFill>
@@ -10286,7 +10286,7 @@
               </a:ln>
               <a:extLst>
                 <a:ext uri="{91240B29-F687-4f45-9708-019B960494DF}">
-                  <a14:hiddenLine xmlns="" xmlns:a14="http://schemas.microsoft.com/office/drawing/2010/main" w="9525">
+                  <a14:hiddenLine xmlns:a14="http://schemas.microsoft.com/office/drawing/2010/main" xmlns="" w="9525">
                     <a:solidFill>
                       <a:srgbClr val="000000"/>
                     </a:solidFill>
@@ -10351,7 +10351,7 @@
               </a:ln>
               <a:extLst>
                 <a:ext uri="{91240B29-F687-4f45-9708-019B960494DF}">
-                  <a14:hiddenLine xmlns="" xmlns:a14="http://schemas.microsoft.com/office/drawing/2010/main" w="9525">
+                  <a14:hiddenLine xmlns:a14="http://schemas.microsoft.com/office/drawing/2010/main" xmlns="" w="9525">
                     <a:solidFill>
                       <a:srgbClr val="000000"/>
                     </a:solidFill>
@@ -10441,7 +10441,7 @@
               </a:ln>
               <a:extLst>
                 <a:ext uri="{91240B29-F687-4f45-9708-019B960494DF}">
-                  <a14:hiddenLine xmlns="" xmlns:a14="http://schemas.microsoft.com/office/drawing/2010/main" w="9525">
+                  <a14:hiddenLine xmlns:a14="http://schemas.microsoft.com/office/drawing/2010/main" xmlns="" w="9525">
                     <a:solidFill>
                       <a:srgbClr val="000000"/>
                     </a:solidFill>
@@ -10503,7 +10503,7 @@
               </a:ln>
               <a:extLst>
                 <a:ext uri="{91240B29-F687-4f45-9708-019B960494DF}">
-                  <a14:hiddenLine xmlns="" xmlns:a14="http://schemas.microsoft.com/office/drawing/2010/main" w="9525">
+                  <a14:hiddenLine xmlns:a14="http://schemas.microsoft.com/office/drawing/2010/main" xmlns="" w="9525">
                     <a:solidFill>
                       <a:srgbClr val="000000"/>
                     </a:solidFill>
@@ -10593,7 +10593,7 @@
               </a:ln>
               <a:extLst>
                 <a:ext uri="{91240B29-F687-4f45-9708-019B960494DF}">
-                  <a14:hiddenLine xmlns="" xmlns:a14="http://schemas.microsoft.com/office/drawing/2010/main" w="9525">
+                  <a14:hiddenLine xmlns:a14="http://schemas.microsoft.com/office/drawing/2010/main" xmlns="" w="9525">
                     <a:solidFill>
                       <a:srgbClr val="000000"/>
                     </a:solidFill>
@@ -10658,7 +10658,7 @@
               </a:ln>
               <a:extLst>
                 <a:ext uri="{91240B29-F687-4f45-9708-019B960494DF}">
-                  <a14:hiddenLine xmlns="" xmlns:a14="http://schemas.microsoft.com/office/drawing/2010/main" w="9525">
+                  <a14:hiddenLine xmlns:a14="http://schemas.microsoft.com/office/drawing/2010/main" xmlns="" w="9525">
                     <a:solidFill>
                       <a:srgbClr val="000000"/>
                     </a:solidFill>
@@ -10720,7 +10720,7 @@
               </a:ln>
               <a:extLst>
                 <a:ext uri="{91240B29-F687-4f45-9708-019B960494DF}">
-                  <a14:hiddenLine xmlns="" xmlns:a14="http://schemas.microsoft.com/office/drawing/2010/main" w="9525">
+                  <a14:hiddenLine xmlns:a14="http://schemas.microsoft.com/office/drawing/2010/main" xmlns="" w="9525">
                     <a:solidFill>
                       <a:srgbClr val="000000"/>
                     </a:solidFill>
@@ -10810,7 +10810,7 @@
               </a:ln>
               <a:extLst>
                 <a:ext uri="{91240B29-F687-4f45-9708-019B960494DF}">
-                  <a14:hiddenLine xmlns="" xmlns:a14="http://schemas.microsoft.com/office/drawing/2010/main" w="9525">
+                  <a14:hiddenLine xmlns:a14="http://schemas.microsoft.com/office/drawing/2010/main" xmlns="" w="9525">
                     <a:solidFill>
                       <a:srgbClr val="000000"/>
                     </a:solidFill>
@@ -10900,7 +10900,7 @@
               </a:ln>
               <a:extLst>
                 <a:ext uri="{91240B29-F687-4f45-9708-019B960494DF}">
-                  <a14:hiddenLine xmlns="" xmlns:a14="http://schemas.microsoft.com/office/drawing/2010/main" w="9525">
+                  <a14:hiddenLine xmlns:a14="http://schemas.microsoft.com/office/drawing/2010/main" xmlns="" w="9525">
                     <a:solidFill>
                       <a:srgbClr val="000000"/>
                     </a:solidFill>
@@ -10965,7 +10965,7 @@
               </a:ln>
               <a:extLst>
                 <a:ext uri="{91240B29-F687-4f45-9708-019B960494DF}">
-                  <a14:hiddenLine xmlns="" xmlns:a14="http://schemas.microsoft.com/office/drawing/2010/main" w="9525">
+                  <a14:hiddenLine xmlns:a14="http://schemas.microsoft.com/office/drawing/2010/main" xmlns="" w="9525">
                     <a:solidFill>
                       <a:srgbClr val="000000"/>
                     </a:solidFill>
@@ -11085,7 +11085,7 @@
               </a:ln>
               <a:extLst>
                 <a:ext uri="{91240B29-F687-4f45-9708-019B960494DF}">
-                  <a14:hiddenLine xmlns="" xmlns:a14="http://schemas.microsoft.com/office/drawing/2010/main" w="9525">
+                  <a14:hiddenLine xmlns:a14="http://schemas.microsoft.com/office/drawing/2010/main" xmlns="" w="9525">
                     <a:solidFill>
                       <a:srgbClr val="000000"/>
                     </a:solidFill>
@@ -11183,7 +11183,7 @@
               </a:ln>
               <a:extLst>
                 <a:ext uri="{91240B29-F687-4f45-9708-019B960494DF}">
-                  <a14:hiddenLine xmlns="" xmlns:a14="http://schemas.microsoft.com/office/drawing/2010/main" w="9525">
+                  <a14:hiddenLine xmlns:a14="http://schemas.microsoft.com/office/drawing/2010/main" xmlns="" w="9525">
                     <a:solidFill>
                       <a:srgbClr val="000000"/>
                     </a:solidFill>
@@ -11298,7 +11298,7 @@
               </a:ln>
               <a:extLst>
                 <a:ext uri="{91240B29-F687-4f45-9708-019B960494DF}">
-                  <a14:hiddenLine xmlns="" xmlns:a14="http://schemas.microsoft.com/office/drawing/2010/main" w="9525">
+                  <a14:hiddenLine xmlns:a14="http://schemas.microsoft.com/office/drawing/2010/main" xmlns="" w="9525">
                     <a:solidFill>
                       <a:srgbClr val="000000"/>
                     </a:solidFill>
@@ -11388,7 +11388,7 @@
               </a:ln>
               <a:extLst>
                 <a:ext uri="{91240B29-F687-4f45-9708-019B960494DF}">
-                  <a14:hiddenLine xmlns="" xmlns:a14="http://schemas.microsoft.com/office/drawing/2010/main" w="9525">
+                  <a14:hiddenLine xmlns:a14="http://schemas.microsoft.com/office/drawing/2010/main" xmlns="" w="9525">
                     <a:solidFill>
                       <a:srgbClr val="000000"/>
                     </a:solidFill>
@@ -11453,7 +11453,7 @@
               </a:ln>
               <a:extLst>
                 <a:ext uri="{91240B29-F687-4f45-9708-019B960494DF}">
-                  <a14:hiddenLine xmlns="" xmlns:a14="http://schemas.microsoft.com/office/drawing/2010/main" w="9525">
+                  <a14:hiddenLine xmlns:a14="http://schemas.microsoft.com/office/drawing/2010/main" xmlns="" w="9525">
                     <a:solidFill>
                       <a:srgbClr val="000000"/>
                     </a:solidFill>
@@ -11543,7 +11543,7 @@
               </a:ln>
               <a:extLst>
                 <a:ext uri="{91240B29-F687-4f45-9708-019B960494DF}">
-                  <a14:hiddenLine xmlns="" xmlns:a14="http://schemas.microsoft.com/office/drawing/2010/main" w="9525">
+                  <a14:hiddenLine xmlns:a14="http://schemas.microsoft.com/office/drawing/2010/main" xmlns="" w="9525">
                     <a:solidFill>
                       <a:srgbClr val="000000"/>
                     </a:solidFill>
@@ -11611,7 +11611,7 @@
               </a:ln>
               <a:extLst>
                 <a:ext uri="{91240B29-F687-4f45-9708-019B960494DF}">
-                  <a14:hiddenLine xmlns="" xmlns:a14="http://schemas.microsoft.com/office/drawing/2010/main" w="9525">
+                  <a14:hiddenLine xmlns:a14="http://schemas.microsoft.com/office/drawing/2010/main" xmlns="" w="9525">
                     <a:solidFill>
                       <a:srgbClr val="000000"/>
                     </a:solidFill>
@@ -11701,7 +11701,7 @@
               </a:ln>
               <a:extLst>
                 <a:ext uri="{91240B29-F687-4f45-9708-019B960494DF}">
-                  <a14:hiddenLine xmlns="" xmlns:a14="http://schemas.microsoft.com/office/drawing/2010/main" w="9525">
+                  <a14:hiddenLine xmlns:a14="http://schemas.microsoft.com/office/drawing/2010/main" xmlns="" w="9525">
                     <a:solidFill>
                       <a:srgbClr val="000000"/>
                     </a:solidFill>
@@ -11769,7 +11769,7 @@
               </a:ln>
               <a:extLst>
                 <a:ext uri="{91240B29-F687-4f45-9708-019B960494DF}">
-                  <a14:hiddenLine xmlns="" xmlns:a14="http://schemas.microsoft.com/office/drawing/2010/main" w="9525">
+                  <a14:hiddenLine xmlns:a14="http://schemas.microsoft.com/office/drawing/2010/main" xmlns="" w="9525">
                     <a:solidFill>
                       <a:srgbClr val="000000"/>
                     </a:solidFill>
@@ -11859,7 +11859,7 @@
               </a:ln>
               <a:extLst>
                 <a:ext uri="{91240B29-F687-4f45-9708-019B960494DF}">
-                  <a14:hiddenLine xmlns="" xmlns:a14="http://schemas.microsoft.com/office/drawing/2010/main" w="9525">
+                  <a14:hiddenLine xmlns:a14="http://schemas.microsoft.com/office/drawing/2010/main" xmlns="" w="9525">
                     <a:solidFill>
                       <a:srgbClr val="000000"/>
                     </a:solidFill>
@@ -11893,7 +11893,7 @@
               </a:ln>
               <a:extLst>
                 <a:ext uri="{91240B29-F687-4f45-9708-019B960494DF}">
-                  <a14:hiddenLine xmlns="" xmlns:a14="http://schemas.microsoft.com/office/drawing/2010/main" w="9525">
+                  <a14:hiddenLine xmlns:a14="http://schemas.microsoft.com/office/drawing/2010/main" xmlns="" w="9525">
                     <a:solidFill>
                       <a:srgbClr val="000000"/>
                     </a:solidFill>
@@ -12033,7 +12033,7 @@
           <a:p>
             <a:fld id="{1844080F-E185-4B6D-9F8A-4CFCF0F63975}" type="datetimeFigureOut">
               <a:rPr lang="fr-FR" smtClean="0"/>
-              <a:t>15/01/2025</a:t>
+              <a:t>16/01/2025</a:t>
             </a:fld>
             <a:endParaRPr lang="fr-FR"/>
           </a:p>
@@ -13719,12 +13719,12 @@
               <a:t> avec </a:t>
             </a:r>
             <a:r>
-              <a:rPr lang="fr-FR" dirty="0" err="1"/>
-              <a:t>postindex</a:t>
+              <a:rPr lang="fr-FR"/>
+              <a:t>post indexation </a:t>
             </a:r>
             <a:r>
               <a:rPr lang="fr-FR" dirty="0"/>
-              <a:t> sur </a:t>
+              <a:t>sur </a:t>
             </a:r>
             <a:r>
               <a:rPr lang="fr-FR" dirty="0" err="1"/>

</xml_diff>